<commit_message>
Slide work and sample project
</commit_message>
<xml_diff>
--- a/Slides/Week 1 - Part 1 - Introduction to Bootstrap.pptx
+++ b/Slides/Week 1 - Part 1 - Introduction to Bootstrap.pptx
@@ -5,36 +5,37 @@
     <p:sldMasterId id="2147483660" r:id="rId4"/>
   </p:sldMasterIdLst>
   <p:notesMasterIdLst>
-    <p:notesMasterId r:id="rId29"/>
+    <p:notesMasterId r:id="rId30"/>
   </p:notesMasterIdLst>
   <p:handoutMasterIdLst>
-    <p:handoutMasterId r:id="rId30"/>
+    <p:handoutMasterId r:id="rId31"/>
   </p:handoutMasterIdLst>
   <p:sldIdLst>
     <p:sldId id="283" r:id="rId5"/>
-    <p:sldId id="284" r:id="rId6"/>
-    <p:sldId id="293" r:id="rId7"/>
-    <p:sldId id="294" r:id="rId8"/>
-    <p:sldId id="306" r:id="rId9"/>
-    <p:sldId id="309" r:id="rId10"/>
-    <p:sldId id="320" r:id="rId11"/>
-    <p:sldId id="299" r:id="rId12"/>
-    <p:sldId id="312" r:id="rId13"/>
-    <p:sldId id="311" r:id="rId14"/>
-    <p:sldId id="296" r:id="rId15"/>
-    <p:sldId id="300" r:id="rId16"/>
-    <p:sldId id="310" r:id="rId17"/>
-    <p:sldId id="313" r:id="rId18"/>
-    <p:sldId id="286" r:id="rId19"/>
-    <p:sldId id="321" r:id="rId20"/>
-    <p:sldId id="322" r:id="rId21"/>
-    <p:sldId id="323" r:id="rId22"/>
-    <p:sldId id="324" r:id="rId23"/>
-    <p:sldId id="302" r:id="rId24"/>
-    <p:sldId id="307" r:id="rId25"/>
-    <p:sldId id="308" r:id="rId26"/>
-    <p:sldId id="298" r:id="rId27"/>
-    <p:sldId id="292" r:id="rId28"/>
+    <p:sldId id="325" r:id="rId6"/>
+    <p:sldId id="284" r:id="rId7"/>
+    <p:sldId id="293" r:id="rId8"/>
+    <p:sldId id="294" r:id="rId9"/>
+    <p:sldId id="306" r:id="rId10"/>
+    <p:sldId id="309" r:id="rId11"/>
+    <p:sldId id="320" r:id="rId12"/>
+    <p:sldId id="299" r:id="rId13"/>
+    <p:sldId id="312" r:id="rId14"/>
+    <p:sldId id="311" r:id="rId15"/>
+    <p:sldId id="296" r:id="rId16"/>
+    <p:sldId id="300" r:id="rId17"/>
+    <p:sldId id="310" r:id="rId18"/>
+    <p:sldId id="313" r:id="rId19"/>
+    <p:sldId id="286" r:id="rId20"/>
+    <p:sldId id="321" r:id="rId21"/>
+    <p:sldId id="322" r:id="rId22"/>
+    <p:sldId id="323" r:id="rId23"/>
+    <p:sldId id="324" r:id="rId24"/>
+    <p:sldId id="302" r:id="rId25"/>
+    <p:sldId id="307" r:id="rId26"/>
+    <p:sldId id="308" r:id="rId27"/>
+    <p:sldId id="298" r:id="rId28"/>
+    <p:sldId id="292" r:id="rId29"/>
   </p:sldIdLst>
   <p:sldSz cx="12192000" cy="6858000"/>
   <p:notesSz cx="6858000" cy="9144000"/>
@@ -226,7 +227,7 @@
           <a:p>
             <a:fld id="{312E7B4A-039C-48A2-9B2C-AF16AA3873D8}" type="datetimeFigureOut">
               <a:rPr lang="en-US" smtClean="0"/>
-              <a:t>12/29/2014</a:t>
+              <a:t>12/30/2014</a:t>
             </a:fld>
             <a:endParaRPr lang="en-US"/>
           </a:p>
@@ -391,7 +392,7 @@
           <a:p>
             <a:fld id="{DA005A0C-54D9-45AA-87D4-C551D08DFCE1}" type="datetimeFigureOut">
               <a:rPr lang="en-US" smtClean="0"/>
-              <a:t>12/29/2014</a:t>
+              <a:t>12/30/2014</a:t>
             </a:fld>
             <a:endParaRPr lang="en-US"/>
           </a:p>
@@ -819,7 +820,7 @@
           <a:p>
             <a:fld id="{4CFD207A-07DF-40AD-A916-9872E089CE7A}" type="slidenum">
               <a:rPr lang="en-US" smtClean="0"/>
-              <a:t>23</a:t>
+              <a:t>24</a:t>
             </a:fld>
             <a:endParaRPr lang="en-US"/>
           </a:p>
@@ -911,7 +912,7 @@
             <a:fld id="{13F0F35F-DD44-4607-AEC1-49D7A4BC4066}" type="slidenum">
               <a:rPr lang="en-US" smtClean="0"/>
               <a:pPr/>
-              <a:t>2</a:t>
+              <a:t>3</a:t>
             </a:fld>
             <a:endParaRPr lang="en-US" dirty="0"/>
           </a:p>
@@ -1003,7 +1004,7 @@
             <a:fld id="{13F0F35F-DD44-4607-AEC1-49D7A4BC4066}" type="slidenum">
               <a:rPr lang="en-US" smtClean="0"/>
               <a:pPr/>
-              <a:t>3</a:t>
+              <a:t>4</a:t>
             </a:fld>
             <a:endParaRPr lang="en-US" dirty="0"/>
           </a:p>
@@ -1095,7 +1096,7 @@
             <a:fld id="{13F0F35F-DD44-4607-AEC1-49D7A4BC4066}" type="slidenum">
               <a:rPr lang="en-US" smtClean="0"/>
               <a:pPr/>
-              <a:t>4</a:t>
+              <a:t>5</a:t>
             </a:fld>
             <a:endParaRPr lang="en-US" dirty="0"/>
           </a:p>
@@ -1184,7 +1185,7 @@
           <a:p>
             <a:fld id="{4CFD207A-07DF-40AD-A916-9872E089CE7A}" type="slidenum">
               <a:rPr lang="en-US" smtClean="0"/>
-              <a:t>7</a:t>
+              <a:t>8</a:t>
             </a:fld>
             <a:endParaRPr lang="en-US"/>
           </a:p>
@@ -1273,7 +1274,7 @@
           <a:p>
             <a:fld id="{4CFD207A-07DF-40AD-A916-9872E089CE7A}" type="slidenum">
               <a:rPr lang="en-US" smtClean="0"/>
-              <a:t>11</a:t>
+              <a:t>12</a:t>
             </a:fld>
             <a:endParaRPr lang="en-US"/>
           </a:p>
@@ -1361,7 +1362,7 @@
           <a:p>
             <a:fld id="{4CFD207A-07DF-40AD-A916-9872E089CE7A}" type="slidenum">
               <a:rPr lang="en-US" smtClean="0"/>
-              <a:t>12</a:t>
+              <a:t>13</a:t>
             </a:fld>
             <a:endParaRPr lang="en-US"/>
           </a:p>
@@ -1505,7 +1506,7 @@
           <a:p>
             <a:fld id="{4CFD207A-07DF-40AD-A916-9872E089CE7A}" type="slidenum">
               <a:rPr lang="en-US" smtClean="0"/>
-              <a:t>15</a:t>
+              <a:t>16</a:t>
             </a:fld>
             <a:endParaRPr lang="en-US"/>
           </a:p>
@@ -1612,7 +1613,7 @@
           <a:p>
             <a:fld id="{4CFD207A-07DF-40AD-A916-9872E089CE7A}" type="slidenum">
               <a:rPr lang="en-US" smtClean="0"/>
-              <a:t>19</a:t>
+              <a:t>20</a:t>
             </a:fld>
             <a:endParaRPr lang="en-US"/>
           </a:p>
@@ -4271,14 +4272,42 @@
         </p:nvSpPr>
         <p:spPr/>
         <p:txBody>
-          <a:bodyPr/>
+          <a:bodyPr>
+            <a:normAutofit fontScale="92500" lnSpcReduction="20000"/>
+          </a:bodyPr>
           <a:lstStyle/>
           <a:p>
             <a:r>
               <a:rPr lang="en-US" dirty="0" smtClean="0"/>
-              <a:t>Christopher Harrison, Content Developer, Microsoft</a:t>
+              <a:t>Christopher </a:t>
+            </a:r>
+            <a:r>
+              <a:rPr lang="en-US" dirty="0" smtClean="0"/>
+              <a:t>Harrison</a:t>
+            </a:r>
+          </a:p>
+          <a:p>
+            <a:r>
+              <a:rPr lang="en-US" dirty="0"/>
+              <a:t>@</a:t>
+            </a:r>
+            <a:r>
+              <a:rPr lang="en-US" dirty="0" err="1"/>
+              <a:t>geektrainer</a:t>
             </a:r>
             <a:endParaRPr lang="en-US" dirty="0"/>
+          </a:p>
+          <a:p>
+            <a:r>
+              <a:rPr lang="en-US" dirty="0" smtClean="0"/>
+              <a:t>Content Developer</a:t>
+            </a:r>
+          </a:p>
+          <a:p>
+            <a:r>
+              <a:rPr lang="en-US" dirty="0" smtClean="0"/>
+              <a:t>Microsoft</a:t>
+            </a:r>
           </a:p>
         </p:txBody>
       </p:sp>
@@ -4303,6 +4332,73 @@
 </file>
 
 <file path=ppt/slides/slide10.xml><?xml version="1.0" encoding="utf-8"?>
+<p:sld xmlns:a="http://schemas.openxmlformats.org/drawingml/2006/main" xmlns:r="http://schemas.openxmlformats.org/officeDocument/2006/relationships" xmlns:p="http://schemas.openxmlformats.org/presentationml/2006/main">
+  <p:cSld>
+    <p:spTree>
+      <p:nvGrpSpPr>
+        <p:cNvPr id="1" name=""/>
+        <p:cNvGrpSpPr/>
+        <p:nvPr/>
+      </p:nvGrpSpPr>
+      <p:grpSpPr>
+        <a:xfrm>
+          <a:off x="0" y="0"/>
+          <a:ext cx="0" cy="0"/>
+          <a:chOff x="0" y="0"/>
+          <a:chExt cx="0" cy="0"/>
+        </a:xfrm>
+      </p:grpSpPr>
+      <p:pic>
+        <p:nvPicPr>
+          <p:cNvPr id="2" name="Picture 1"/>
+          <p:cNvPicPr>
+            <a:picLocks noChangeAspect="1"/>
+          </p:cNvPicPr>
+          <p:nvPr/>
+        </p:nvPicPr>
+        <p:blipFill>
+          <a:blip r:embed="rId2">
+            <a:extLst>
+              <a:ext uri="{28A0092B-C50C-407E-A947-70E740481C1C}">
+                <a14:useLocalDpi xmlns:a14="http://schemas.microsoft.com/office/drawing/2010/main" val="0"/>
+              </a:ext>
+            </a:extLst>
+          </a:blip>
+          <a:stretch>
+            <a:fillRect/>
+          </a:stretch>
+        </p:blipFill>
+        <p:spPr>
+          <a:xfrm>
+            <a:off x="1297167" y="0"/>
+            <a:ext cx="9597665" cy="6858000"/>
+          </a:xfrm>
+          <a:prstGeom prst="rect">
+            <a:avLst/>
+          </a:prstGeom>
+        </p:spPr>
+      </p:pic>
+    </p:spTree>
+    <p:extLst>
+      <p:ext uri="{BB962C8B-B14F-4D97-AF65-F5344CB8AC3E}">
+        <p14:creationId xmlns:p14="http://schemas.microsoft.com/office/powerpoint/2010/main" val="1482994489"/>
+      </p:ext>
+    </p:extLst>
+  </p:cSld>
+  <p:clrMapOvr>
+    <a:masterClrMapping/>
+  </p:clrMapOvr>
+  <p:timing>
+    <p:tnLst>
+      <p:par>
+        <p:cTn id="1" dur="indefinite" restart="never" nodeType="tmRoot"/>
+      </p:par>
+    </p:tnLst>
+  </p:timing>
+</p:sld>
+</file>
+
+<file path=ppt/slides/slide11.xml><?xml version="1.0" encoding="utf-8"?>
 <p:sld xmlns:a="http://schemas.openxmlformats.org/drawingml/2006/main" xmlns:r="http://schemas.openxmlformats.org/officeDocument/2006/relationships" xmlns:p="http://schemas.openxmlformats.org/presentationml/2006/main">
   <p:cSld>
     <p:spTree>
@@ -4369,7 +4465,7 @@
 </p:sld>
 </file>
 
-<file path=ppt/slides/slide11.xml><?xml version="1.0" encoding="utf-8"?>
+<file path=ppt/slides/slide12.xml><?xml version="1.0" encoding="utf-8"?>
 <p:sld xmlns:a="http://schemas.openxmlformats.org/drawingml/2006/main" xmlns:r="http://schemas.openxmlformats.org/officeDocument/2006/relationships" xmlns:p="http://schemas.openxmlformats.org/presentationml/2006/main">
   <p:cSld>
     <p:spTree>
@@ -4429,7 +4525,7 @@
 </p:sld>
 </file>
 
-<file path=ppt/slides/slide12.xml><?xml version="1.0" encoding="utf-8"?>
+<file path=ppt/slides/slide13.xml><?xml version="1.0" encoding="utf-8"?>
 <p:sld xmlns:a="http://schemas.openxmlformats.org/drawingml/2006/main" xmlns:r="http://schemas.openxmlformats.org/officeDocument/2006/relationships" xmlns:p="http://schemas.openxmlformats.org/presentationml/2006/main">
   <p:cSld>
     <p:spTree>
@@ -4508,7 +4604,7 @@
 </p:sld>
 </file>
 
-<file path=ppt/slides/slide13.xml><?xml version="1.0" encoding="utf-8"?>
+<file path=ppt/slides/slide14.xml><?xml version="1.0" encoding="utf-8"?>
 <p:sld xmlns:a="http://schemas.openxmlformats.org/drawingml/2006/main" xmlns:r="http://schemas.openxmlformats.org/officeDocument/2006/relationships" xmlns:p="http://schemas.openxmlformats.org/presentationml/2006/main">
   <p:cSld>
     <p:spTree>
@@ -4597,7 +4693,7 @@
 </p:sld>
 </file>
 
-<file path=ppt/slides/slide14.xml><?xml version="1.0" encoding="utf-8"?>
+<file path=ppt/slides/slide15.xml><?xml version="1.0" encoding="utf-8"?>
 <p:sld xmlns:a="http://schemas.openxmlformats.org/drawingml/2006/main" xmlns:r="http://schemas.openxmlformats.org/officeDocument/2006/relationships" xmlns:p="http://schemas.openxmlformats.org/presentationml/2006/main">
   <p:cSld>
     <p:spTree>
@@ -4717,7 +4813,7 @@
 </p:sld>
 </file>
 
-<file path=ppt/slides/slide15.xml><?xml version="1.0" encoding="utf-8"?>
+<file path=ppt/slides/slide16.xml><?xml version="1.0" encoding="utf-8"?>
 <p:sld xmlns:a="http://schemas.openxmlformats.org/drawingml/2006/main" xmlns:r="http://schemas.openxmlformats.org/officeDocument/2006/relationships" xmlns:p="http://schemas.openxmlformats.org/presentationml/2006/main">
   <p:cSld>
     <p:spTree>
@@ -4751,7 +4847,7 @@
           <a:p>
             <a:r>
               <a:rPr lang="en-US" dirty="0" smtClean="0"/>
-              <a:t>Bootstrap - Responsive</a:t>
+              <a:t>Responsive UI</a:t>
             </a:r>
             <a:endParaRPr lang="en-US" dirty="0"/>
           </a:p>
@@ -4777,7 +4873,7 @@
 </p:sld>
 </file>
 
-<file path=ppt/slides/slide16.xml><?xml version="1.0" encoding="utf-8"?>
+<file path=ppt/slides/slide17.xml><?xml version="1.0" encoding="utf-8"?>
 <p:sld xmlns:a="http://schemas.openxmlformats.org/drawingml/2006/main" xmlns:r="http://schemas.openxmlformats.org/officeDocument/2006/relationships" xmlns:p="http://schemas.openxmlformats.org/presentationml/2006/main">
   <p:cSld>
     <p:spTree>
@@ -4856,7 +4952,7 @@
 </p:sld>
 </file>
 
-<file path=ppt/slides/slide17.xml><?xml version="1.0" encoding="utf-8"?>
+<file path=ppt/slides/slide18.xml><?xml version="1.0" encoding="utf-8"?>
 <p:sld xmlns:a="http://schemas.openxmlformats.org/drawingml/2006/main" xmlns:r="http://schemas.openxmlformats.org/officeDocument/2006/relationships" xmlns:p="http://schemas.openxmlformats.org/presentationml/2006/main">
   <p:cSld>
     <p:spTree>
@@ -5390,7 +5486,7 @@
 </p:sld>
 </file>
 
-<file path=ppt/slides/slide18.xml><?xml version="1.0" encoding="utf-8"?>
+<file path=ppt/slides/slide19.xml><?xml version="1.0" encoding="utf-8"?>
 <p:sld xmlns:a="http://schemas.openxmlformats.org/drawingml/2006/main" xmlns:r="http://schemas.openxmlformats.org/officeDocument/2006/relationships" xmlns:p="http://schemas.openxmlformats.org/presentationml/2006/main">
   <p:cSld>
     <p:spTree>
@@ -5476,7 +5572,7 @@
 </p:sld>
 </file>
 
-<file path=ppt/slides/slide19.xml><?xml version="1.0" encoding="utf-8"?>
+<file path=ppt/slides/slide2.xml><?xml version="1.0" encoding="utf-8"?>
 <p:sld xmlns:a="http://schemas.openxmlformats.org/drawingml/2006/main" xmlns:r="http://schemas.openxmlformats.org/officeDocument/2006/relationships" xmlns:p="http://schemas.openxmlformats.org/presentationml/2006/main">
   <p:cSld>
     <p:spTree>
@@ -5495,7 +5591,7 @@
       </p:grpSpPr>
       <p:sp>
         <p:nvSpPr>
-          <p:cNvPr id="2" name="Title 1"/>
+          <p:cNvPr id="4" name="Title 3"/>
           <p:cNvSpPr>
             <a:spLocks noGrp="1"/>
           </p:cNvSpPr>
@@ -5510,7 +5606,136 @@
           <a:p>
             <a:r>
               <a:rPr lang="en-US" dirty="0" smtClean="0"/>
-              <a:t>Bootstrap - Grid</a:t>
+              <a:t>Setting Expectations</a:t>
+            </a:r>
+            <a:endParaRPr lang="en-US" dirty="0"/>
+          </a:p>
+        </p:txBody>
+      </p:sp>
+      <p:sp>
+        <p:nvSpPr>
+          <p:cNvPr id="5" name="Content Placeholder 4"/>
+          <p:cNvSpPr>
+            <a:spLocks noGrp="1"/>
+          </p:cNvSpPr>
+          <p:nvPr>
+            <p:ph sz="quarter" idx="10"/>
+          </p:nvPr>
+        </p:nvSpPr>
+        <p:spPr/>
+        <p:txBody>
+          <a:bodyPr/>
+          <a:lstStyle/>
+          <a:p>
+            <a:r>
+              <a:rPr lang="en-US" dirty="0" smtClean="0"/>
+              <a:t>Not going to cover everything in Bootstrap</a:t>
+            </a:r>
+          </a:p>
+          <a:p>
+            <a:pPr lvl="1"/>
+            <a:r>
+              <a:rPr lang="en-US" dirty="0" smtClean="0"/>
+              <a:t>Help get you up and running on building great looking sites</a:t>
+            </a:r>
+          </a:p>
+          <a:p>
+            <a:r>
+              <a:rPr lang="en-US" dirty="0" smtClean="0"/>
+              <a:t>Some CSS and HTML experience required</a:t>
+            </a:r>
+          </a:p>
+          <a:p>
+            <a:pPr lvl="1"/>
+            <a:r>
+              <a:rPr lang="en-US" dirty="0" smtClean="0"/>
+              <a:t>Plenty of resources available</a:t>
+            </a:r>
+          </a:p>
+          <a:p>
+            <a:r>
+              <a:rPr lang="en-US" dirty="0" smtClean="0"/>
+              <a:t>Lots of demos</a:t>
+            </a:r>
+          </a:p>
+          <a:p>
+            <a:pPr lvl="1"/>
+            <a:r>
+              <a:rPr lang="en-US" dirty="0" smtClean="0"/>
+              <a:t>Proof of concept</a:t>
+            </a:r>
+          </a:p>
+          <a:p>
+            <a:r>
+              <a:rPr lang="en-US" dirty="0" smtClean="0"/>
+              <a:t>Labs supplement course</a:t>
+            </a:r>
+          </a:p>
+          <a:p>
+            <a:pPr lvl="1"/>
+            <a:r>
+              <a:rPr lang="en-US" dirty="0" smtClean="0"/>
+              <a:t>Apply skills in a "real world" scenario</a:t>
+            </a:r>
+            <a:endParaRPr lang="en-US" dirty="0"/>
+          </a:p>
+        </p:txBody>
+      </p:sp>
+    </p:spTree>
+    <p:extLst>
+      <p:ext uri="{BB962C8B-B14F-4D97-AF65-F5344CB8AC3E}">
+        <p14:creationId xmlns:p14="http://schemas.microsoft.com/office/powerpoint/2010/main" val="1016094148"/>
+      </p:ext>
+    </p:extLst>
+  </p:cSld>
+  <p:clrMapOvr>
+    <a:masterClrMapping/>
+  </p:clrMapOvr>
+  <p:timing>
+    <p:tnLst>
+      <p:par>
+        <p:cTn id="1" dur="indefinite" restart="never" nodeType="tmRoot"/>
+      </p:par>
+    </p:tnLst>
+  </p:timing>
+</p:sld>
+</file>
+
+<file path=ppt/slides/slide20.xml><?xml version="1.0" encoding="utf-8"?>
+<p:sld xmlns:a="http://schemas.openxmlformats.org/drawingml/2006/main" xmlns:r="http://schemas.openxmlformats.org/officeDocument/2006/relationships" xmlns:p="http://schemas.openxmlformats.org/presentationml/2006/main">
+  <p:cSld>
+    <p:spTree>
+      <p:nvGrpSpPr>
+        <p:cNvPr id="1" name=""/>
+        <p:cNvGrpSpPr/>
+        <p:nvPr/>
+      </p:nvGrpSpPr>
+      <p:grpSpPr>
+        <a:xfrm>
+          <a:off x="0" y="0"/>
+          <a:ext cx="0" cy="0"/>
+          <a:chOff x="0" y="0"/>
+          <a:chExt cx="0" cy="0"/>
+        </a:xfrm>
+      </p:grpSpPr>
+      <p:sp>
+        <p:nvSpPr>
+          <p:cNvPr id="2" name="Title 1"/>
+          <p:cNvSpPr>
+            <a:spLocks noGrp="1"/>
+          </p:cNvSpPr>
+          <p:nvPr>
+            <p:ph type="title"/>
+          </p:nvPr>
+        </p:nvSpPr>
+        <p:spPr/>
+        <p:txBody>
+          <a:bodyPr/>
+          <a:lstStyle/>
+          <a:p>
+            <a:r>
+              <a:rPr lang="en-US" dirty="0" smtClean="0"/>
+              <a:t>Grid system</a:t>
             </a:r>
             <a:endParaRPr lang="en-US" dirty="0"/>
           </a:p>
@@ -5536,7 +5761,367 @@
 </p:sld>
 </file>
 
-<file path=ppt/slides/slide2.xml><?xml version="1.0" encoding="utf-8"?>
+<file path=ppt/slides/slide21.xml><?xml version="1.0" encoding="utf-8"?>
+<p:sld xmlns:a="http://schemas.openxmlformats.org/drawingml/2006/main" xmlns:r="http://schemas.openxmlformats.org/officeDocument/2006/relationships" xmlns:p="http://schemas.openxmlformats.org/presentationml/2006/main">
+  <p:cSld>
+    <p:spTree>
+      <p:nvGrpSpPr>
+        <p:cNvPr id="1" name=""/>
+        <p:cNvGrpSpPr/>
+        <p:nvPr/>
+      </p:nvGrpSpPr>
+      <p:grpSpPr>
+        <a:xfrm>
+          <a:off x="0" y="0"/>
+          <a:ext cx="0" cy="0"/>
+          <a:chOff x="0" y="0"/>
+          <a:chExt cx="0" cy="0"/>
+        </a:xfrm>
+      </p:grpSpPr>
+      <p:sp>
+        <p:nvSpPr>
+          <p:cNvPr id="6" name="Text Placeholder 5"/>
+          <p:cNvSpPr>
+            <a:spLocks noGrp="1"/>
+          </p:cNvSpPr>
+          <p:nvPr>
+            <p:ph type="body" sz="quarter" idx="10"/>
+          </p:nvPr>
+        </p:nvSpPr>
+        <p:spPr/>
+        <p:txBody>
+          <a:bodyPr/>
+          <a:lstStyle/>
+          <a:p>
+            <a:r>
+              <a:rPr lang="en-US" dirty="0" smtClean="0"/>
+              <a:t>Visual Studio support</a:t>
+            </a:r>
+            <a:endParaRPr lang="en-US" dirty="0"/>
+          </a:p>
+        </p:txBody>
+      </p:sp>
+      <p:sp>
+        <p:nvSpPr>
+          <p:cNvPr id="5" name="Subtitle 4"/>
+          <p:cNvSpPr>
+            <a:spLocks noGrp="1"/>
+          </p:cNvSpPr>
+          <p:nvPr>
+            <p:ph type="subTitle" idx="1"/>
+          </p:nvPr>
+        </p:nvSpPr>
+        <p:spPr/>
+        <p:txBody>
+          <a:bodyPr/>
+          <a:lstStyle/>
+          <a:p>
+            <a:endParaRPr lang="en-US"/>
+          </a:p>
+        </p:txBody>
+      </p:sp>
+    </p:spTree>
+    <p:extLst>
+      <p:ext uri="{BB962C8B-B14F-4D97-AF65-F5344CB8AC3E}">
+        <p14:creationId xmlns:p14="http://schemas.microsoft.com/office/powerpoint/2010/main" val="1488578929"/>
+      </p:ext>
+    </p:extLst>
+  </p:cSld>
+  <p:clrMapOvr>
+    <a:masterClrMapping/>
+  </p:clrMapOvr>
+  <p:timing>
+    <p:tnLst>
+      <p:par>
+        <p:cTn id="1" dur="indefinite" restart="never" nodeType="tmRoot"/>
+      </p:par>
+    </p:tnLst>
+  </p:timing>
+</p:sld>
+</file>
+
+<file path=ppt/slides/slide22.xml><?xml version="1.0" encoding="utf-8"?>
+<p:sld xmlns:a="http://schemas.openxmlformats.org/drawingml/2006/main" xmlns:r="http://schemas.openxmlformats.org/officeDocument/2006/relationships" xmlns:p="http://schemas.openxmlformats.org/presentationml/2006/main">
+  <p:cSld>
+    <p:spTree>
+      <p:nvGrpSpPr>
+        <p:cNvPr id="1" name=""/>
+        <p:cNvGrpSpPr/>
+        <p:nvPr/>
+      </p:nvGrpSpPr>
+      <p:grpSpPr>
+        <a:xfrm>
+          <a:off x="0" y="0"/>
+          <a:ext cx="0" cy="0"/>
+          <a:chOff x="0" y="0"/>
+          <a:chExt cx="0" cy="0"/>
+        </a:xfrm>
+      </p:grpSpPr>
+      <p:sp>
+        <p:nvSpPr>
+          <p:cNvPr id="2" name="Title 1"/>
+          <p:cNvSpPr>
+            <a:spLocks noGrp="1"/>
+          </p:cNvSpPr>
+          <p:nvPr>
+            <p:ph type="title"/>
+          </p:nvPr>
+        </p:nvSpPr>
+        <p:spPr/>
+        <p:txBody>
+          <a:bodyPr/>
+          <a:lstStyle/>
+          <a:p>
+            <a:r>
+              <a:rPr lang="en-US" dirty="0" smtClean="0"/>
+              <a:t>Visual Studio – Class IntelliSense</a:t>
+            </a:r>
+            <a:endParaRPr lang="en-US" dirty="0"/>
+          </a:p>
+        </p:txBody>
+      </p:sp>
+      <p:pic>
+        <p:nvPicPr>
+          <p:cNvPr id="4" name="Content Placeholder 3"/>
+          <p:cNvPicPr>
+            <a:picLocks noGrp="1" noChangeAspect="1"/>
+          </p:cNvPicPr>
+          <p:nvPr>
+            <p:ph sz="quarter" idx="10"/>
+          </p:nvPr>
+        </p:nvPicPr>
+        <p:blipFill>
+          <a:blip r:embed="rId2"/>
+          <a:stretch>
+            <a:fillRect/>
+          </a:stretch>
+        </p:blipFill>
+        <p:spPr>
+          <a:xfrm>
+            <a:off x="2440146" y="1973767"/>
+            <a:ext cx="5902167" cy="3283240"/>
+          </a:xfrm>
+          <a:prstGeom prst="rect">
+            <a:avLst/>
+          </a:prstGeom>
+        </p:spPr>
+      </p:pic>
+    </p:spTree>
+    <p:extLst>
+      <p:ext uri="{BB962C8B-B14F-4D97-AF65-F5344CB8AC3E}">
+        <p14:creationId xmlns:p14="http://schemas.microsoft.com/office/powerpoint/2010/main" val="2661705909"/>
+      </p:ext>
+    </p:extLst>
+  </p:cSld>
+  <p:clrMapOvr>
+    <a:masterClrMapping/>
+  </p:clrMapOvr>
+  <p:timing>
+    <p:tnLst>
+      <p:par>
+        <p:cTn id="1" dur="indefinite" restart="never" nodeType="tmRoot"/>
+      </p:par>
+    </p:tnLst>
+  </p:timing>
+</p:sld>
+</file>
+
+<file path=ppt/slides/slide23.xml><?xml version="1.0" encoding="utf-8"?>
+<p:sld xmlns:a="http://schemas.openxmlformats.org/drawingml/2006/main" xmlns:r="http://schemas.openxmlformats.org/officeDocument/2006/relationships" xmlns:p="http://schemas.openxmlformats.org/presentationml/2006/main">
+  <p:cSld>
+    <p:spTree>
+      <p:nvGrpSpPr>
+        <p:cNvPr id="1" name=""/>
+        <p:cNvGrpSpPr/>
+        <p:nvPr/>
+      </p:nvGrpSpPr>
+      <p:grpSpPr>
+        <a:xfrm>
+          <a:off x="0" y="0"/>
+          <a:ext cx="0" cy="0"/>
+          <a:chOff x="0" y="0"/>
+          <a:chExt cx="0" cy="0"/>
+        </a:xfrm>
+      </p:grpSpPr>
+      <p:sp>
+        <p:nvSpPr>
+          <p:cNvPr id="2" name="Title 1"/>
+          <p:cNvSpPr>
+            <a:spLocks noGrp="1"/>
+          </p:cNvSpPr>
+          <p:nvPr>
+            <p:ph type="title"/>
+          </p:nvPr>
+        </p:nvSpPr>
+        <p:spPr/>
+        <p:txBody>
+          <a:bodyPr/>
+          <a:lstStyle/>
+          <a:p>
+            <a:r>
+              <a:rPr lang="en-US" dirty="0" smtClean="0"/>
+              <a:t>Visual Studio – Missing Class Detection</a:t>
+            </a:r>
+            <a:endParaRPr lang="en-US" dirty="0"/>
+          </a:p>
+        </p:txBody>
+      </p:sp>
+      <p:pic>
+        <p:nvPicPr>
+          <p:cNvPr id="4" name="Content Placeholder 3"/>
+          <p:cNvPicPr>
+            <a:picLocks noGrp="1" noChangeAspect="1"/>
+          </p:cNvPicPr>
+          <p:nvPr>
+            <p:ph sz="quarter" idx="10"/>
+          </p:nvPr>
+        </p:nvPicPr>
+        <p:blipFill>
+          <a:blip r:embed="rId2"/>
+          <a:stretch>
+            <a:fillRect/>
+          </a:stretch>
+        </p:blipFill>
+        <p:spPr>
+          <a:xfrm>
+            <a:off x="961984" y="2386361"/>
+            <a:ext cx="7276367" cy="1598709"/>
+          </a:xfrm>
+          <a:prstGeom prst="rect">
+            <a:avLst/>
+          </a:prstGeom>
+        </p:spPr>
+      </p:pic>
+    </p:spTree>
+    <p:extLst>
+      <p:ext uri="{BB962C8B-B14F-4D97-AF65-F5344CB8AC3E}">
+        <p14:creationId xmlns:p14="http://schemas.microsoft.com/office/powerpoint/2010/main" val="360559877"/>
+      </p:ext>
+    </p:extLst>
+  </p:cSld>
+  <p:clrMapOvr>
+    <a:masterClrMapping/>
+  </p:clrMapOvr>
+  <p:timing>
+    <p:tnLst>
+      <p:par>
+        <p:cTn id="1" dur="indefinite" restart="never" nodeType="tmRoot"/>
+      </p:par>
+    </p:tnLst>
+  </p:timing>
+</p:sld>
+</file>
+
+<file path=ppt/slides/slide24.xml><?xml version="1.0" encoding="utf-8"?>
+<p:sld xmlns:a="http://schemas.openxmlformats.org/drawingml/2006/main" xmlns:r="http://schemas.openxmlformats.org/officeDocument/2006/relationships" xmlns:p="http://schemas.openxmlformats.org/presentationml/2006/main">
+  <p:cSld>
+    <p:spTree>
+      <p:nvGrpSpPr>
+        <p:cNvPr id="1" name=""/>
+        <p:cNvGrpSpPr/>
+        <p:nvPr/>
+      </p:nvGrpSpPr>
+      <p:grpSpPr>
+        <a:xfrm>
+          <a:off x="0" y="0"/>
+          <a:ext cx="0" cy="0"/>
+          <a:chOff x="0" y="0"/>
+          <a:chExt cx="0" cy="0"/>
+        </a:xfrm>
+      </p:grpSpPr>
+      <p:sp>
+        <p:nvSpPr>
+          <p:cNvPr id="2" name="Title 1"/>
+          <p:cNvSpPr>
+            <a:spLocks noGrp="1"/>
+          </p:cNvSpPr>
+          <p:nvPr>
+            <p:ph type="title"/>
+          </p:nvPr>
+        </p:nvSpPr>
+        <p:spPr/>
+        <p:txBody>
+          <a:bodyPr/>
+          <a:lstStyle/>
+          <a:p>
+            <a:r>
+              <a:rPr lang="en-US" dirty="0" smtClean="0"/>
+              <a:t>Visual </a:t>
+            </a:r>
+            <a:r>
+              <a:rPr lang="en-US" smtClean="0"/>
+              <a:t>Studio Support</a:t>
+            </a:r>
+            <a:endParaRPr lang="en-US" dirty="0"/>
+          </a:p>
+        </p:txBody>
+      </p:sp>
+    </p:spTree>
+    <p:extLst>
+      <p:ext uri="{BB962C8B-B14F-4D97-AF65-F5344CB8AC3E}">
+        <p14:creationId xmlns:p14="http://schemas.microsoft.com/office/powerpoint/2010/main" val="2582563794"/>
+      </p:ext>
+    </p:extLst>
+  </p:cSld>
+  <p:clrMapOvr>
+    <a:masterClrMapping/>
+  </p:clrMapOvr>
+  <p:timing>
+    <p:tnLst>
+      <p:par>
+        <p:cTn id="1" dur="indefinite" restart="never" nodeType="tmRoot"/>
+      </p:par>
+    </p:tnLst>
+  </p:timing>
+</p:sld>
+</file>
+
+<file path=ppt/slides/slide25.xml><?xml version="1.0" encoding="utf-8"?>
+<p:sld xmlns:a="http://schemas.openxmlformats.org/drawingml/2006/main" xmlns:r="http://schemas.openxmlformats.org/officeDocument/2006/relationships" xmlns:p="http://schemas.openxmlformats.org/presentationml/2006/main">
+  <p:cSld>
+    <p:spTree>
+      <p:nvGrpSpPr>
+        <p:cNvPr id="1" name=""/>
+        <p:cNvGrpSpPr/>
+        <p:nvPr/>
+      </p:nvGrpSpPr>
+      <p:grpSpPr>
+        <a:xfrm>
+          <a:off x="0" y="0"/>
+          <a:ext cx="0" cy="0"/>
+          <a:chOff x="0" y="0"/>
+          <a:chExt cx="0" cy="0"/>
+        </a:xfrm>
+      </p:grpSpPr>
+    </p:spTree>
+    <p:extLst>
+      <p:ext uri="{BB962C8B-B14F-4D97-AF65-F5344CB8AC3E}">
+        <p14:creationId xmlns:p14="http://schemas.microsoft.com/office/powerpoint/2010/main" val="13701683"/>
+      </p:ext>
+    </p:extLst>
+  </p:cSld>
+  <p:clrMapOvr>
+    <a:masterClrMapping/>
+  </p:clrMapOvr>
+  <mc:AlternateContent xmlns:mc="http://schemas.openxmlformats.org/markup-compatibility/2006" xmlns:p14="http://schemas.microsoft.com/office/powerpoint/2010/main">
+    <mc:Choice Requires="p14">
+      <p:transition spd="slow" p14:dur="2000"/>
+    </mc:Choice>
+    <mc:Fallback xmlns="">
+      <p:transition spd="slow"/>
+    </mc:Fallback>
+  </mc:AlternateContent>
+  <p:timing>
+    <p:tnLst>
+      <p:par>
+        <p:cTn id="1" dur="indefinite" restart="never" nodeType="tmRoot"/>
+      </p:par>
+    </p:tnLst>
+  </p:timing>
+</p:sld>
+</file>
+
+<file path=ppt/slides/slide3.xml><?xml version="1.0" encoding="utf-8"?>
 <p:sld xmlns:a="http://schemas.openxmlformats.org/drawingml/2006/main" xmlns:r="http://schemas.openxmlformats.org/officeDocument/2006/relationships" xmlns:p="http://schemas.openxmlformats.org/presentationml/2006/main">
   <p:cSld>
     <p:bg>
@@ -5676,363 +6261,7 @@
 </p:sld>
 </file>
 
-<file path=ppt/slides/slide20.xml><?xml version="1.0" encoding="utf-8"?>
-<p:sld xmlns:a="http://schemas.openxmlformats.org/drawingml/2006/main" xmlns:r="http://schemas.openxmlformats.org/officeDocument/2006/relationships" xmlns:p="http://schemas.openxmlformats.org/presentationml/2006/main">
-  <p:cSld>
-    <p:spTree>
-      <p:nvGrpSpPr>
-        <p:cNvPr id="1" name=""/>
-        <p:cNvGrpSpPr/>
-        <p:nvPr/>
-      </p:nvGrpSpPr>
-      <p:grpSpPr>
-        <a:xfrm>
-          <a:off x="0" y="0"/>
-          <a:ext cx="0" cy="0"/>
-          <a:chOff x="0" y="0"/>
-          <a:chExt cx="0" cy="0"/>
-        </a:xfrm>
-      </p:grpSpPr>
-      <p:sp>
-        <p:nvSpPr>
-          <p:cNvPr id="6" name="Text Placeholder 5"/>
-          <p:cNvSpPr>
-            <a:spLocks noGrp="1"/>
-          </p:cNvSpPr>
-          <p:nvPr>
-            <p:ph type="body" sz="quarter" idx="10"/>
-          </p:nvPr>
-        </p:nvSpPr>
-        <p:spPr/>
-        <p:txBody>
-          <a:bodyPr/>
-          <a:lstStyle/>
-          <a:p>
-            <a:r>
-              <a:rPr lang="en-US" dirty="0" smtClean="0"/>
-              <a:t>Visual Studio support</a:t>
-            </a:r>
-            <a:endParaRPr lang="en-US" dirty="0"/>
-          </a:p>
-        </p:txBody>
-      </p:sp>
-      <p:sp>
-        <p:nvSpPr>
-          <p:cNvPr id="5" name="Subtitle 4"/>
-          <p:cNvSpPr>
-            <a:spLocks noGrp="1"/>
-          </p:cNvSpPr>
-          <p:nvPr>
-            <p:ph type="subTitle" idx="1"/>
-          </p:nvPr>
-        </p:nvSpPr>
-        <p:spPr/>
-        <p:txBody>
-          <a:bodyPr/>
-          <a:lstStyle/>
-          <a:p>
-            <a:endParaRPr lang="en-US"/>
-          </a:p>
-        </p:txBody>
-      </p:sp>
-    </p:spTree>
-    <p:extLst>
-      <p:ext uri="{BB962C8B-B14F-4D97-AF65-F5344CB8AC3E}">
-        <p14:creationId xmlns:p14="http://schemas.microsoft.com/office/powerpoint/2010/main" val="1488578929"/>
-      </p:ext>
-    </p:extLst>
-  </p:cSld>
-  <p:clrMapOvr>
-    <a:masterClrMapping/>
-  </p:clrMapOvr>
-  <p:timing>
-    <p:tnLst>
-      <p:par>
-        <p:cTn id="1" dur="indefinite" restart="never" nodeType="tmRoot"/>
-      </p:par>
-    </p:tnLst>
-  </p:timing>
-</p:sld>
-</file>
-
-<file path=ppt/slides/slide21.xml><?xml version="1.0" encoding="utf-8"?>
-<p:sld xmlns:a="http://schemas.openxmlformats.org/drawingml/2006/main" xmlns:r="http://schemas.openxmlformats.org/officeDocument/2006/relationships" xmlns:p="http://schemas.openxmlformats.org/presentationml/2006/main">
-  <p:cSld>
-    <p:spTree>
-      <p:nvGrpSpPr>
-        <p:cNvPr id="1" name=""/>
-        <p:cNvGrpSpPr/>
-        <p:nvPr/>
-      </p:nvGrpSpPr>
-      <p:grpSpPr>
-        <a:xfrm>
-          <a:off x="0" y="0"/>
-          <a:ext cx="0" cy="0"/>
-          <a:chOff x="0" y="0"/>
-          <a:chExt cx="0" cy="0"/>
-        </a:xfrm>
-      </p:grpSpPr>
-      <p:sp>
-        <p:nvSpPr>
-          <p:cNvPr id="2" name="Title 1"/>
-          <p:cNvSpPr>
-            <a:spLocks noGrp="1"/>
-          </p:cNvSpPr>
-          <p:nvPr>
-            <p:ph type="title"/>
-          </p:nvPr>
-        </p:nvSpPr>
-        <p:spPr/>
-        <p:txBody>
-          <a:bodyPr/>
-          <a:lstStyle/>
-          <a:p>
-            <a:r>
-              <a:rPr lang="en-US" dirty="0" smtClean="0"/>
-              <a:t>Visual Studio – Class IntelliSense</a:t>
-            </a:r>
-            <a:endParaRPr lang="en-US" dirty="0"/>
-          </a:p>
-        </p:txBody>
-      </p:sp>
-      <p:pic>
-        <p:nvPicPr>
-          <p:cNvPr id="4" name="Content Placeholder 3"/>
-          <p:cNvPicPr>
-            <a:picLocks noGrp="1" noChangeAspect="1"/>
-          </p:cNvPicPr>
-          <p:nvPr>
-            <p:ph sz="quarter" idx="10"/>
-          </p:nvPr>
-        </p:nvPicPr>
-        <p:blipFill>
-          <a:blip r:embed="rId2"/>
-          <a:stretch>
-            <a:fillRect/>
-          </a:stretch>
-        </p:blipFill>
-        <p:spPr>
-          <a:xfrm>
-            <a:off x="2440146" y="1973767"/>
-            <a:ext cx="5902167" cy="3283240"/>
-          </a:xfrm>
-          <a:prstGeom prst="rect">
-            <a:avLst/>
-          </a:prstGeom>
-        </p:spPr>
-      </p:pic>
-    </p:spTree>
-    <p:extLst>
-      <p:ext uri="{BB962C8B-B14F-4D97-AF65-F5344CB8AC3E}">
-        <p14:creationId xmlns:p14="http://schemas.microsoft.com/office/powerpoint/2010/main" val="2661705909"/>
-      </p:ext>
-    </p:extLst>
-  </p:cSld>
-  <p:clrMapOvr>
-    <a:masterClrMapping/>
-  </p:clrMapOvr>
-  <p:timing>
-    <p:tnLst>
-      <p:par>
-        <p:cTn id="1" dur="indefinite" restart="never" nodeType="tmRoot"/>
-      </p:par>
-    </p:tnLst>
-  </p:timing>
-</p:sld>
-</file>
-
-<file path=ppt/slides/slide22.xml><?xml version="1.0" encoding="utf-8"?>
-<p:sld xmlns:a="http://schemas.openxmlformats.org/drawingml/2006/main" xmlns:r="http://schemas.openxmlformats.org/officeDocument/2006/relationships" xmlns:p="http://schemas.openxmlformats.org/presentationml/2006/main">
-  <p:cSld>
-    <p:spTree>
-      <p:nvGrpSpPr>
-        <p:cNvPr id="1" name=""/>
-        <p:cNvGrpSpPr/>
-        <p:nvPr/>
-      </p:nvGrpSpPr>
-      <p:grpSpPr>
-        <a:xfrm>
-          <a:off x="0" y="0"/>
-          <a:ext cx="0" cy="0"/>
-          <a:chOff x="0" y="0"/>
-          <a:chExt cx="0" cy="0"/>
-        </a:xfrm>
-      </p:grpSpPr>
-      <p:sp>
-        <p:nvSpPr>
-          <p:cNvPr id="2" name="Title 1"/>
-          <p:cNvSpPr>
-            <a:spLocks noGrp="1"/>
-          </p:cNvSpPr>
-          <p:nvPr>
-            <p:ph type="title"/>
-          </p:nvPr>
-        </p:nvSpPr>
-        <p:spPr/>
-        <p:txBody>
-          <a:bodyPr/>
-          <a:lstStyle/>
-          <a:p>
-            <a:r>
-              <a:rPr lang="en-US" dirty="0" smtClean="0"/>
-              <a:t>Visual Studio – Missing Class Detection</a:t>
-            </a:r>
-            <a:endParaRPr lang="en-US" dirty="0"/>
-          </a:p>
-        </p:txBody>
-      </p:sp>
-      <p:pic>
-        <p:nvPicPr>
-          <p:cNvPr id="4" name="Content Placeholder 3"/>
-          <p:cNvPicPr>
-            <a:picLocks noGrp="1" noChangeAspect="1"/>
-          </p:cNvPicPr>
-          <p:nvPr>
-            <p:ph sz="quarter" idx="10"/>
-          </p:nvPr>
-        </p:nvPicPr>
-        <p:blipFill>
-          <a:blip r:embed="rId2"/>
-          <a:stretch>
-            <a:fillRect/>
-          </a:stretch>
-        </p:blipFill>
-        <p:spPr>
-          <a:xfrm>
-            <a:off x="961984" y="2386361"/>
-            <a:ext cx="7276367" cy="1598709"/>
-          </a:xfrm>
-          <a:prstGeom prst="rect">
-            <a:avLst/>
-          </a:prstGeom>
-        </p:spPr>
-      </p:pic>
-    </p:spTree>
-    <p:extLst>
-      <p:ext uri="{BB962C8B-B14F-4D97-AF65-F5344CB8AC3E}">
-        <p14:creationId xmlns:p14="http://schemas.microsoft.com/office/powerpoint/2010/main" val="360559877"/>
-      </p:ext>
-    </p:extLst>
-  </p:cSld>
-  <p:clrMapOvr>
-    <a:masterClrMapping/>
-  </p:clrMapOvr>
-  <p:timing>
-    <p:tnLst>
-      <p:par>
-        <p:cTn id="1" dur="indefinite" restart="never" nodeType="tmRoot"/>
-      </p:par>
-    </p:tnLst>
-  </p:timing>
-</p:sld>
-</file>
-
-<file path=ppt/slides/slide23.xml><?xml version="1.0" encoding="utf-8"?>
-<p:sld xmlns:a="http://schemas.openxmlformats.org/drawingml/2006/main" xmlns:r="http://schemas.openxmlformats.org/officeDocument/2006/relationships" xmlns:p="http://schemas.openxmlformats.org/presentationml/2006/main">
-  <p:cSld>
-    <p:spTree>
-      <p:nvGrpSpPr>
-        <p:cNvPr id="1" name=""/>
-        <p:cNvGrpSpPr/>
-        <p:nvPr/>
-      </p:nvGrpSpPr>
-      <p:grpSpPr>
-        <a:xfrm>
-          <a:off x="0" y="0"/>
-          <a:ext cx="0" cy="0"/>
-          <a:chOff x="0" y="0"/>
-          <a:chExt cx="0" cy="0"/>
-        </a:xfrm>
-      </p:grpSpPr>
-      <p:sp>
-        <p:nvSpPr>
-          <p:cNvPr id="2" name="Title 1"/>
-          <p:cNvSpPr>
-            <a:spLocks noGrp="1"/>
-          </p:cNvSpPr>
-          <p:nvPr>
-            <p:ph type="title"/>
-          </p:nvPr>
-        </p:nvSpPr>
-        <p:spPr/>
-        <p:txBody>
-          <a:bodyPr/>
-          <a:lstStyle/>
-          <a:p>
-            <a:r>
-              <a:rPr lang="en-US" dirty="0" smtClean="0"/>
-              <a:t>Bootstrap – Visual Studio Support</a:t>
-            </a:r>
-            <a:endParaRPr lang="en-US" dirty="0"/>
-          </a:p>
-        </p:txBody>
-      </p:sp>
-    </p:spTree>
-    <p:extLst>
-      <p:ext uri="{BB962C8B-B14F-4D97-AF65-F5344CB8AC3E}">
-        <p14:creationId xmlns:p14="http://schemas.microsoft.com/office/powerpoint/2010/main" val="2582563794"/>
-      </p:ext>
-    </p:extLst>
-  </p:cSld>
-  <p:clrMapOvr>
-    <a:masterClrMapping/>
-  </p:clrMapOvr>
-  <p:timing>
-    <p:tnLst>
-      <p:par>
-        <p:cTn id="1" dur="indefinite" restart="never" nodeType="tmRoot"/>
-      </p:par>
-    </p:tnLst>
-  </p:timing>
-</p:sld>
-</file>
-
-<file path=ppt/slides/slide24.xml><?xml version="1.0" encoding="utf-8"?>
-<p:sld xmlns:a="http://schemas.openxmlformats.org/drawingml/2006/main" xmlns:r="http://schemas.openxmlformats.org/officeDocument/2006/relationships" xmlns:p="http://schemas.openxmlformats.org/presentationml/2006/main">
-  <p:cSld>
-    <p:spTree>
-      <p:nvGrpSpPr>
-        <p:cNvPr id="1" name=""/>
-        <p:cNvGrpSpPr/>
-        <p:nvPr/>
-      </p:nvGrpSpPr>
-      <p:grpSpPr>
-        <a:xfrm>
-          <a:off x="0" y="0"/>
-          <a:ext cx="0" cy="0"/>
-          <a:chOff x="0" y="0"/>
-          <a:chExt cx="0" cy="0"/>
-        </a:xfrm>
-      </p:grpSpPr>
-    </p:spTree>
-    <p:extLst>
-      <p:ext uri="{BB962C8B-B14F-4D97-AF65-F5344CB8AC3E}">
-        <p14:creationId xmlns:p14="http://schemas.microsoft.com/office/powerpoint/2010/main" val="13701683"/>
-      </p:ext>
-    </p:extLst>
-  </p:cSld>
-  <p:clrMapOvr>
-    <a:masterClrMapping/>
-  </p:clrMapOvr>
-  <mc:AlternateContent xmlns:mc="http://schemas.openxmlformats.org/markup-compatibility/2006" xmlns:p14="http://schemas.microsoft.com/office/powerpoint/2010/main">
-    <mc:Choice Requires="p14">
-      <p:transition spd="slow" p14:dur="2000"/>
-    </mc:Choice>
-    <mc:Fallback xmlns="">
-      <p:transition spd="slow"/>
-    </mc:Fallback>
-  </mc:AlternateContent>
-  <p:timing>
-    <p:tnLst>
-      <p:par>
-        <p:cTn id="1" dur="indefinite" restart="never" nodeType="tmRoot"/>
-      </p:par>
-    </p:tnLst>
-  </p:timing>
-</p:sld>
-</file>
-
-<file path=ppt/slides/slide3.xml><?xml version="1.0" encoding="utf-8"?>
+<file path=ppt/slides/slide4.xml><?xml version="1.0" encoding="utf-8"?>
 <p:sld xmlns:a="http://schemas.openxmlformats.org/drawingml/2006/main" xmlns:r="http://schemas.openxmlformats.org/officeDocument/2006/relationships" xmlns:p="http://schemas.openxmlformats.org/presentationml/2006/main">
   <p:cSld>
     <p:spTree>
@@ -6165,7 +6394,7 @@
 </p:sld>
 </file>
 
-<file path=ppt/slides/slide4.xml><?xml version="1.0" encoding="utf-8"?>
+<file path=ppt/slides/slide5.xml><?xml version="1.0" encoding="utf-8"?>
 <p:sld xmlns:a="http://schemas.openxmlformats.org/drawingml/2006/main" xmlns:r="http://schemas.openxmlformats.org/officeDocument/2006/relationships" xmlns:p="http://schemas.openxmlformats.org/presentationml/2006/main">
   <p:cSld>
     <p:spTree>
@@ -6305,7 +6534,7 @@
 </p:sld>
 </file>
 
-<file path=ppt/slides/slide5.xml><?xml version="1.0" encoding="utf-8"?>
+<file path=ppt/slides/slide6.xml><?xml version="1.0" encoding="utf-8"?>
 <p:sld xmlns:a="http://schemas.openxmlformats.org/drawingml/2006/main" xmlns:r="http://schemas.openxmlformats.org/officeDocument/2006/relationships" xmlns:p="http://schemas.openxmlformats.org/presentationml/2006/main">
   <p:cSld>
     <p:spTree>
@@ -6628,7 +6857,7 @@
 </p:sld>
 </file>
 
-<file path=ppt/slides/slide6.xml><?xml version="1.0" encoding="utf-8"?>
+<file path=ppt/slides/slide7.xml><?xml version="1.0" encoding="utf-8"?>
 <p:sld xmlns:a="http://schemas.openxmlformats.org/drawingml/2006/main" xmlns:r="http://schemas.openxmlformats.org/officeDocument/2006/relationships" xmlns:p="http://schemas.openxmlformats.org/presentationml/2006/main">
   <p:cSld>
     <p:spTree>
@@ -6717,66 +6946,6 @@
 </p:sld>
 </file>
 
-<file path=ppt/slides/slide7.xml><?xml version="1.0" encoding="utf-8"?>
-<p:sld xmlns:a="http://schemas.openxmlformats.org/drawingml/2006/main" xmlns:r="http://schemas.openxmlformats.org/officeDocument/2006/relationships" xmlns:p="http://schemas.openxmlformats.org/presentationml/2006/main">
-  <p:cSld>
-    <p:spTree>
-      <p:nvGrpSpPr>
-        <p:cNvPr id="1" name=""/>
-        <p:cNvGrpSpPr/>
-        <p:nvPr/>
-      </p:nvGrpSpPr>
-      <p:grpSpPr>
-        <a:xfrm>
-          <a:off x="0" y="0"/>
-          <a:ext cx="0" cy="0"/>
-          <a:chOff x="0" y="0"/>
-          <a:chExt cx="0" cy="0"/>
-        </a:xfrm>
-      </p:grpSpPr>
-      <p:sp>
-        <p:nvSpPr>
-          <p:cNvPr id="2" name="Title 1"/>
-          <p:cNvSpPr>
-            <a:spLocks noGrp="1"/>
-          </p:cNvSpPr>
-          <p:nvPr>
-            <p:ph type="title"/>
-          </p:nvPr>
-        </p:nvSpPr>
-        <p:spPr/>
-        <p:txBody>
-          <a:bodyPr/>
-          <a:lstStyle/>
-          <a:p>
-            <a:r>
-              <a:rPr lang="en-US" dirty="0" smtClean="0"/>
-              <a:t>A quick lap around Bootstrap</a:t>
-            </a:r>
-            <a:endParaRPr lang="en-US" dirty="0"/>
-          </a:p>
-        </p:txBody>
-      </p:sp>
-    </p:spTree>
-    <p:extLst>
-      <p:ext uri="{BB962C8B-B14F-4D97-AF65-F5344CB8AC3E}">
-        <p14:creationId xmlns:p14="http://schemas.microsoft.com/office/powerpoint/2010/main" val="1306283251"/>
-      </p:ext>
-    </p:extLst>
-  </p:cSld>
-  <p:clrMapOvr>
-    <a:masterClrMapping/>
-  </p:clrMapOvr>
-  <p:timing>
-    <p:tnLst>
-      <p:par>
-        <p:cTn id="1" dur="indefinite" restart="never" nodeType="tmRoot"/>
-      </p:par>
-    </p:tnLst>
-  </p:timing>
-</p:sld>
-</file>
-
 <file path=ppt/slides/slide8.xml><?xml version="1.0" encoding="utf-8"?>
 <p:sld xmlns:a="http://schemas.openxmlformats.org/drawingml/2006/main" xmlns:r="http://schemas.openxmlformats.org/officeDocument/2006/relationships" xmlns:p="http://schemas.openxmlformats.org/presentationml/2006/main">
   <p:cSld>
@@ -6796,12 +6965,12 @@
       </p:grpSpPr>
       <p:sp>
         <p:nvSpPr>
-          <p:cNvPr id="6" name="Text Placeholder 5"/>
+          <p:cNvPr id="2" name="Title 1"/>
           <p:cNvSpPr>
             <a:spLocks noGrp="1"/>
           </p:cNvSpPr>
           <p:nvPr>
-            <p:ph type="body" sz="quarter" idx="10"/>
+            <p:ph type="title"/>
           </p:nvPr>
         </p:nvSpPr>
         <p:spPr/>
@@ -6811,35 +6980,16 @@
           <a:p>
             <a:r>
               <a:rPr lang="en-US" dirty="0" smtClean="0"/>
-              <a:t>Theme Support</a:t>
+              <a:t>A quick lap around Bootstrap</a:t>
             </a:r>
             <a:endParaRPr lang="en-US" dirty="0"/>
-          </a:p>
-        </p:txBody>
-      </p:sp>
-      <p:sp>
-        <p:nvSpPr>
-          <p:cNvPr id="5" name="Subtitle 4"/>
-          <p:cNvSpPr>
-            <a:spLocks noGrp="1"/>
-          </p:cNvSpPr>
-          <p:nvPr>
-            <p:ph type="subTitle" idx="1"/>
-          </p:nvPr>
-        </p:nvSpPr>
-        <p:spPr/>
-        <p:txBody>
-          <a:bodyPr/>
-          <a:lstStyle/>
-          <a:p>
-            <a:endParaRPr lang="en-US"/>
           </a:p>
         </p:txBody>
       </p:sp>
     </p:spTree>
     <p:extLst>
       <p:ext uri="{BB962C8B-B14F-4D97-AF65-F5344CB8AC3E}">
-        <p14:creationId xmlns:p14="http://schemas.microsoft.com/office/powerpoint/2010/main" val="63205358"/>
+        <p14:creationId xmlns:p14="http://schemas.microsoft.com/office/powerpoint/2010/main" val="1306283251"/>
       </p:ext>
     </p:extLst>
   </p:cSld>
@@ -6873,40 +7023,52 @@
           <a:chExt cx="0" cy="0"/>
         </a:xfrm>
       </p:grpSpPr>
-      <p:pic>
-        <p:nvPicPr>
-          <p:cNvPr id="2" name="Picture 1"/>
-          <p:cNvPicPr>
-            <a:picLocks noChangeAspect="1"/>
-          </p:cNvPicPr>
-          <p:nvPr/>
-        </p:nvPicPr>
-        <p:blipFill>
-          <a:blip r:embed="rId2">
-            <a:extLst>
-              <a:ext uri="{28A0092B-C50C-407E-A947-70E740481C1C}">
-                <a14:useLocalDpi xmlns:a14="http://schemas.microsoft.com/office/drawing/2010/main" val="0"/>
-              </a:ext>
-            </a:extLst>
-          </a:blip>
-          <a:stretch>
-            <a:fillRect/>
-          </a:stretch>
-        </p:blipFill>
-        <p:spPr>
-          <a:xfrm>
-            <a:off x="1297167" y="0"/>
-            <a:ext cx="9597665" cy="6858000"/>
-          </a:xfrm>
-          <a:prstGeom prst="rect">
-            <a:avLst/>
-          </a:prstGeom>
-        </p:spPr>
-      </p:pic>
+      <p:sp>
+        <p:nvSpPr>
+          <p:cNvPr id="6" name="Text Placeholder 5"/>
+          <p:cNvSpPr>
+            <a:spLocks noGrp="1"/>
+          </p:cNvSpPr>
+          <p:nvPr>
+            <p:ph type="body" sz="quarter" idx="10"/>
+          </p:nvPr>
+        </p:nvSpPr>
+        <p:spPr/>
+        <p:txBody>
+          <a:bodyPr/>
+          <a:lstStyle/>
+          <a:p>
+            <a:r>
+              <a:rPr lang="en-US" dirty="0" smtClean="0"/>
+              <a:t>Theme Support</a:t>
+            </a:r>
+            <a:endParaRPr lang="en-US" dirty="0"/>
+          </a:p>
+        </p:txBody>
+      </p:sp>
+      <p:sp>
+        <p:nvSpPr>
+          <p:cNvPr id="5" name="Subtitle 4"/>
+          <p:cNvSpPr>
+            <a:spLocks noGrp="1"/>
+          </p:cNvSpPr>
+          <p:nvPr>
+            <p:ph type="subTitle" idx="1"/>
+          </p:nvPr>
+        </p:nvSpPr>
+        <p:spPr/>
+        <p:txBody>
+          <a:bodyPr/>
+          <a:lstStyle/>
+          <a:p>
+            <a:endParaRPr lang="en-US"/>
+          </a:p>
+        </p:txBody>
+      </p:sp>
     </p:spTree>
     <p:extLst>
       <p:ext uri="{BB962C8B-B14F-4D97-AF65-F5344CB8AC3E}">
-        <p14:creationId xmlns:p14="http://schemas.microsoft.com/office/powerpoint/2010/main" val="1482994489"/>
+        <p14:creationId xmlns:p14="http://schemas.microsoft.com/office/powerpoint/2010/main" val="63205358"/>
       </p:ext>
     </p:extLst>
   </p:cSld>

</xml_diff>

<commit_message>
Slide updates and demos
</commit_message>
<xml_diff>
--- a/Slides/Week 1 - Part 1 - Introduction to Bootstrap.pptx
+++ b/Slides/Week 1 - Part 1 - Introduction to Bootstrap.pptx
@@ -5,10 +5,10 @@
     <p:sldMasterId id="2147483660" r:id="rId4"/>
   </p:sldMasterIdLst>
   <p:notesMasterIdLst>
-    <p:notesMasterId r:id="rId30"/>
+    <p:notesMasterId r:id="rId18"/>
   </p:notesMasterIdLst>
   <p:handoutMasterIdLst>
-    <p:handoutMasterId r:id="rId31"/>
+    <p:handoutMasterId r:id="rId19"/>
   </p:handoutMasterIdLst>
   <p:sldIdLst>
     <p:sldId id="283" r:id="rId5"/>
@@ -23,19 +23,7 @@
     <p:sldId id="312" r:id="rId14"/>
     <p:sldId id="311" r:id="rId15"/>
     <p:sldId id="296" r:id="rId16"/>
-    <p:sldId id="300" r:id="rId17"/>
-    <p:sldId id="310" r:id="rId18"/>
-    <p:sldId id="313" r:id="rId19"/>
-    <p:sldId id="286" r:id="rId20"/>
-    <p:sldId id="321" r:id="rId21"/>
-    <p:sldId id="322" r:id="rId22"/>
-    <p:sldId id="323" r:id="rId23"/>
-    <p:sldId id="324" r:id="rId24"/>
-    <p:sldId id="302" r:id="rId25"/>
-    <p:sldId id="307" r:id="rId26"/>
-    <p:sldId id="308" r:id="rId27"/>
-    <p:sldId id="298" r:id="rId28"/>
-    <p:sldId id="292" r:id="rId29"/>
+    <p:sldId id="292" r:id="rId17"/>
   </p:sldIdLst>
   <p:sldSz cx="12192000" cy="6858000"/>
   <p:notesSz cx="6858000" cy="9144000"/>
@@ -750,95 +738,6 @@
 </p:notes>
 </file>
 
-<file path=ppt/notesSlides/notesSlide10.xml><?xml version="1.0" encoding="utf-8"?>
-<p:notes xmlns:a="http://schemas.openxmlformats.org/drawingml/2006/main" xmlns:r="http://schemas.openxmlformats.org/officeDocument/2006/relationships" xmlns:p="http://schemas.openxmlformats.org/presentationml/2006/main">
-  <p:cSld>
-    <p:spTree>
-      <p:nvGrpSpPr>
-        <p:cNvPr id="1" name=""/>
-        <p:cNvGrpSpPr/>
-        <p:nvPr/>
-      </p:nvGrpSpPr>
-      <p:grpSpPr>
-        <a:xfrm>
-          <a:off x="0" y="0"/>
-          <a:ext cx="0" cy="0"/>
-          <a:chOff x="0" y="0"/>
-          <a:chExt cx="0" cy="0"/>
-        </a:xfrm>
-      </p:grpSpPr>
-      <p:sp>
-        <p:nvSpPr>
-          <p:cNvPr id="2" name="Slide Image Placeholder 1"/>
-          <p:cNvSpPr>
-            <a:spLocks noGrp="1" noRot="1" noChangeAspect="1"/>
-          </p:cNvSpPr>
-          <p:nvPr>
-            <p:ph type="sldImg"/>
-          </p:nvPr>
-        </p:nvSpPr>
-        <p:spPr/>
-      </p:sp>
-      <p:sp>
-        <p:nvSpPr>
-          <p:cNvPr id="3" name="Notes Placeholder 2"/>
-          <p:cNvSpPr>
-            <a:spLocks noGrp="1"/>
-          </p:cNvSpPr>
-          <p:nvPr>
-            <p:ph type="body" idx="1"/>
-          </p:nvPr>
-        </p:nvSpPr>
-        <p:spPr/>
-        <p:txBody>
-          <a:bodyPr/>
-          <a:lstStyle/>
-          <a:p>
-            <a:endParaRPr lang="en-GB" dirty="0">
-              <a:solidFill>
-                <a:schemeClr val="tx2"/>
-              </a:solidFill>
-              <a:latin typeface="Segoe" pitchFamily="34" charset="0"/>
-            </a:endParaRPr>
-          </a:p>
-        </p:txBody>
-      </p:sp>
-      <p:sp>
-        <p:nvSpPr>
-          <p:cNvPr id="4" name="Slide Number Placeholder 3"/>
-          <p:cNvSpPr>
-            <a:spLocks noGrp="1"/>
-          </p:cNvSpPr>
-          <p:nvPr>
-            <p:ph type="sldNum" sz="quarter" idx="10"/>
-          </p:nvPr>
-        </p:nvSpPr>
-        <p:spPr/>
-        <p:txBody>
-          <a:bodyPr/>
-          <a:lstStyle/>
-          <a:p>
-            <a:fld id="{4CFD207A-07DF-40AD-A916-9872E089CE7A}" type="slidenum">
-              <a:rPr lang="en-US" smtClean="0"/>
-              <a:t>24</a:t>
-            </a:fld>
-            <a:endParaRPr lang="en-US"/>
-          </a:p>
-        </p:txBody>
-      </p:sp>
-    </p:spTree>
-    <p:extLst>
-      <p:ext uri="{BB962C8B-B14F-4D97-AF65-F5344CB8AC3E}">
-        <p14:creationId xmlns:p14="http://schemas.microsoft.com/office/powerpoint/2010/main" val="2260015646"/>
-      </p:ext>
-    </p:extLst>
-  </p:cSld>
-  <p:clrMapOvr>
-    <a:masterClrMapping/>
-  </p:clrMapOvr>
-</p:notes>
-</file>
-
 <file path=ppt/notesSlides/notesSlide2.xml><?xml version="1.0" encoding="utf-8"?>
 <p:notes xmlns:a="http://schemas.openxmlformats.org/drawingml/2006/main" xmlns:r="http://schemas.openxmlformats.org/officeDocument/2006/relationships" xmlns:p="http://schemas.openxmlformats.org/presentationml/2006/main">
   <p:cSld>
@@ -1284,345 +1183,6 @@
     <p:extLst>
       <p:ext uri="{BB962C8B-B14F-4D97-AF65-F5344CB8AC3E}">
         <p14:creationId xmlns:p14="http://schemas.microsoft.com/office/powerpoint/2010/main" val="3757284374"/>
-      </p:ext>
-    </p:extLst>
-  </p:cSld>
-  <p:clrMapOvr>
-    <a:masterClrMapping/>
-  </p:clrMapOvr>
-</p:notes>
-</file>
-
-<file path=ppt/notesSlides/notesSlide7.xml><?xml version="1.0" encoding="utf-8"?>
-<p:notes xmlns:a="http://schemas.openxmlformats.org/drawingml/2006/main" xmlns:r="http://schemas.openxmlformats.org/officeDocument/2006/relationships" xmlns:p="http://schemas.openxmlformats.org/presentationml/2006/main">
-  <p:cSld>
-    <p:spTree>
-      <p:nvGrpSpPr>
-        <p:cNvPr id="1" name=""/>
-        <p:cNvGrpSpPr/>
-        <p:nvPr/>
-      </p:nvGrpSpPr>
-      <p:grpSpPr>
-        <a:xfrm>
-          <a:off x="0" y="0"/>
-          <a:ext cx="0" cy="0"/>
-          <a:chOff x="0" y="0"/>
-          <a:chExt cx="0" cy="0"/>
-        </a:xfrm>
-      </p:grpSpPr>
-      <p:sp>
-        <p:nvSpPr>
-          <p:cNvPr id="2" name="Slide Image Placeholder 1"/>
-          <p:cNvSpPr>
-            <a:spLocks noGrp="1" noRot="1" noChangeAspect="1"/>
-          </p:cNvSpPr>
-          <p:nvPr>
-            <p:ph type="sldImg"/>
-          </p:nvPr>
-        </p:nvSpPr>
-        <p:spPr/>
-      </p:sp>
-      <p:sp>
-        <p:nvSpPr>
-          <p:cNvPr id="3" name="Notes Placeholder 2"/>
-          <p:cNvSpPr>
-            <a:spLocks noGrp="1"/>
-          </p:cNvSpPr>
-          <p:nvPr>
-            <p:ph type="body" idx="1"/>
-          </p:nvPr>
-        </p:nvSpPr>
-        <p:spPr/>
-        <p:txBody>
-          <a:bodyPr/>
-          <a:lstStyle/>
-          <a:p>
-            <a:r>
-              <a:rPr lang="en-US" dirty="0" err="1" smtClean="0"/>
-              <a:t>Bootswatch</a:t>
-            </a:r>
-            <a:endParaRPr lang="en-US" dirty="0"/>
-          </a:p>
-        </p:txBody>
-      </p:sp>
-      <p:sp>
-        <p:nvSpPr>
-          <p:cNvPr id="4" name="Slide Number Placeholder 3"/>
-          <p:cNvSpPr>
-            <a:spLocks noGrp="1"/>
-          </p:cNvSpPr>
-          <p:nvPr>
-            <p:ph type="sldNum" sz="quarter" idx="10"/>
-          </p:nvPr>
-        </p:nvSpPr>
-        <p:spPr/>
-        <p:txBody>
-          <a:bodyPr/>
-          <a:lstStyle/>
-          <a:p>
-            <a:fld id="{4CFD207A-07DF-40AD-A916-9872E089CE7A}" type="slidenum">
-              <a:rPr lang="en-US" smtClean="0"/>
-              <a:t>13</a:t>
-            </a:fld>
-            <a:endParaRPr lang="en-US"/>
-          </a:p>
-        </p:txBody>
-      </p:sp>
-    </p:spTree>
-    <p:extLst>
-      <p:ext uri="{BB962C8B-B14F-4D97-AF65-F5344CB8AC3E}">
-        <p14:creationId xmlns:p14="http://schemas.microsoft.com/office/powerpoint/2010/main" val="1293695596"/>
-      </p:ext>
-    </p:extLst>
-  </p:cSld>
-  <p:clrMapOvr>
-    <a:masterClrMapping/>
-  </p:clrMapOvr>
-</p:notes>
-</file>
-
-<file path=ppt/notesSlides/notesSlide8.xml><?xml version="1.0" encoding="utf-8"?>
-<p:notes xmlns:a="http://schemas.openxmlformats.org/drawingml/2006/main" xmlns:r="http://schemas.openxmlformats.org/officeDocument/2006/relationships" xmlns:p="http://schemas.openxmlformats.org/presentationml/2006/main">
-  <p:cSld>
-    <p:spTree>
-      <p:nvGrpSpPr>
-        <p:cNvPr id="1" name=""/>
-        <p:cNvGrpSpPr/>
-        <p:nvPr/>
-      </p:nvGrpSpPr>
-      <p:grpSpPr>
-        <a:xfrm>
-          <a:off x="0" y="0"/>
-          <a:ext cx="0" cy="0"/>
-          <a:chOff x="0" y="0"/>
-          <a:chExt cx="0" cy="0"/>
-        </a:xfrm>
-      </p:grpSpPr>
-      <p:sp>
-        <p:nvSpPr>
-          <p:cNvPr id="2" name="Slide Image Placeholder 1"/>
-          <p:cNvSpPr>
-            <a:spLocks noGrp="1" noRot="1" noChangeAspect="1"/>
-          </p:cNvSpPr>
-          <p:nvPr>
-            <p:ph type="sldImg"/>
-          </p:nvPr>
-        </p:nvSpPr>
-        <p:spPr/>
-      </p:sp>
-      <p:sp>
-        <p:nvSpPr>
-          <p:cNvPr id="3" name="Notes Placeholder 2"/>
-          <p:cNvSpPr>
-            <a:spLocks noGrp="1"/>
-          </p:cNvSpPr>
-          <p:nvPr>
-            <p:ph type="body" idx="1"/>
-          </p:nvPr>
-        </p:nvSpPr>
-        <p:spPr/>
-        <p:txBody>
-          <a:bodyPr/>
-          <a:lstStyle/>
-          <a:p>
-            <a:pPr lvl="0" fontAlgn="ctr"/>
-            <a:r>
-              <a:rPr lang="en-US" sz="1200" kern="1200" dirty="0" smtClean="0">
-                <a:solidFill>
-                  <a:schemeClr val="tx1"/>
-                </a:solidFill>
-                <a:effectLst/>
-                <a:latin typeface="+mn-lt"/>
-                <a:ea typeface="+mn-ea"/>
-                <a:cs typeface="+mn-cs"/>
-              </a:rPr>
-              <a:t>Show page responding to screen width changes</a:t>
-            </a:r>
-          </a:p>
-          <a:p>
-            <a:pPr lvl="0" fontAlgn="ctr"/>
-            <a:r>
-              <a:rPr lang="en-US" sz="1200" kern="1200" dirty="0" smtClean="0">
-                <a:solidFill>
-                  <a:schemeClr val="tx1"/>
-                </a:solidFill>
-                <a:effectLst/>
-                <a:latin typeface="+mn-lt"/>
-                <a:ea typeface="+mn-ea"/>
-                <a:cs typeface="+mn-cs"/>
-              </a:rPr>
-              <a:t>Show page in mobile browser</a:t>
-            </a:r>
-          </a:p>
-          <a:p>
-            <a:pPr lvl="0" fontAlgn="ctr"/>
-            <a:r>
-              <a:rPr lang="en-US" sz="1200" kern="1200" dirty="0" smtClean="0">
-                <a:solidFill>
-                  <a:schemeClr val="tx1"/>
-                </a:solidFill>
-                <a:effectLst/>
-                <a:latin typeface="+mn-lt"/>
-                <a:ea typeface="+mn-ea"/>
-                <a:cs typeface="+mn-cs"/>
-              </a:rPr>
-              <a:t>Emphasize</a:t>
-            </a:r>
-            <a:r>
-              <a:rPr lang="en-US" sz="1200" kern="1200" baseline="0" dirty="0" smtClean="0">
-                <a:solidFill>
-                  <a:schemeClr val="tx1"/>
-                </a:solidFill>
-                <a:effectLst/>
-                <a:latin typeface="+mn-lt"/>
-                <a:ea typeface="+mn-ea"/>
-                <a:cs typeface="+mn-cs"/>
-              </a:rPr>
-              <a:t> that this is just HTML and CSS – no server or JS code</a:t>
-            </a:r>
-            <a:endParaRPr lang="en-GB" dirty="0">
-              <a:solidFill>
-                <a:schemeClr val="tx2"/>
-              </a:solidFill>
-              <a:latin typeface="Segoe" pitchFamily="34" charset="0"/>
-            </a:endParaRPr>
-          </a:p>
-        </p:txBody>
-      </p:sp>
-      <p:sp>
-        <p:nvSpPr>
-          <p:cNvPr id="4" name="Slide Number Placeholder 3"/>
-          <p:cNvSpPr>
-            <a:spLocks noGrp="1"/>
-          </p:cNvSpPr>
-          <p:nvPr>
-            <p:ph type="sldNum" sz="quarter" idx="10"/>
-          </p:nvPr>
-        </p:nvSpPr>
-        <p:spPr/>
-        <p:txBody>
-          <a:bodyPr/>
-          <a:lstStyle/>
-          <a:p>
-            <a:fld id="{4CFD207A-07DF-40AD-A916-9872E089CE7A}" type="slidenum">
-              <a:rPr lang="en-US" smtClean="0"/>
-              <a:t>16</a:t>
-            </a:fld>
-            <a:endParaRPr lang="en-US"/>
-          </a:p>
-        </p:txBody>
-      </p:sp>
-    </p:spTree>
-    <p:extLst>
-      <p:ext uri="{BB962C8B-B14F-4D97-AF65-F5344CB8AC3E}">
-        <p14:creationId xmlns:p14="http://schemas.microsoft.com/office/powerpoint/2010/main" val="3284511809"/>
-      </p:ext>
-    </p:extLst>
-  </p:cSld>
-  <p:clrMapOvr>
-    <a:masterClrMapping/>
-  </p:clrMapOvr>
-</p:notes>
-</file>
-
-<file path=ppt/notesSlides/notesSlide9.xml><?xml version="1.0" encoding="utf-8"?>
-<p:notes xmlns:a="http://schemas.openxmlformats.org/drawingml/2006/main" xmlns:r="http://schemas.openxmlformats.org/officeDocument/2006/relationships" xmlns:p="http://schemas.openxmlformats.org/presentationml/2006/main">
-  <p:cSld>
-    <p:spTree>
-      <p:nvGrpSpPr>
-        <p:cNvPr id="1" name=""/>
-        <p:cNvGrpSpPr/>
-        <p:nvPr/>
-      </p:nvGrpSpPr>
-      <p:grpSpPr>
-        <a:xfrm>
-          <a:off x="0" y="0"/>
-          <a:ext cx="0" cy="0"/>
-          <a:chOff x="0" y="0"/>
-          <a:chExt cx="0" cy="0"/>
-        </a:xfrm>
-      </p:grpSpPr>
-      <p:sp>
-        <p:nvSpPr>
-          <p:cNvPr id="2" name="Slide Image Placeholder 1"/>
-          <p:cNvSpPr>
-            <a:spLocks noGrp="1" noRot="1" noChangeAspect="1"/>
-          </p:cNvSpPr>
-          <p:nvPr>
-            <p:ph type="sldImg"/>
-          </p:nvPr>
-        </p:nvSpPr>
-        <p:spPr/>
-      </p:sp>
-      <p:sp>
-        <p:nvSpPr>
-          <p:cNvPr id="3" name="Notes Placeholder 2"/>
-          <p:cNvSpPr>
-            <a:spLocks noGrp="1"/>
-          </p:cNvSpPr>
-          <p:nvPr>
-            <p:ph type="body" idx="1"/>
-          </p:nvPr>
-        </p:nvSpPr>
-        <p:spPr/>
-        <p:txBody>
-          <a:bodyPr/>
-          <a:lstStyle/>
-          <a:p>
-            <a:r>
-              <a:rPr lang="en-GB" dirty="0" smtClean="0">
-                <a:solidFill>
-                  <a:schemeClr val="tx2"/>
-                </a:solidFill>
-                <a:latin typeface="Segoe" pitchFamily="34" charset="0"/>
-              </a:rPr>
-              <a:t>Christopher</a:t>
-            </a:r>
-            <a:r>
-              <a:rPr lang="en-GB" baseline="0" dirty="0" smtClean="0">
-                <a:solidFill>
-                  <a:schemeClr val="tx2"/>
-                </a:solidFill>
-                <a:latin typeface="Segoe" pitchFamily="34" charset="0"/>
-              </a:rPr>
-              <a:t> - Grid</a:t>
-            </a:r>
-            <a:endParaRPr lang="en-GB" dirty="0">
-              <a:solidFill>
-                <a:schemeClr val="tx2"/>
-              </a:solidFill>
-              <a:latin typeface="Segoe" pitchFamily="34" charset="0"/>
-            </a:endParaRPr>
-          </a:p>
-        </p:txBody>
-      </p:sp>
-      <p:sp>
-        <p:nvSpPr>
-          <p:cNvPr id="4" name="Slide Number Placeholder 3"/>
-          <p:cNvSpPr>
-            <a:spLocks noGrp="1"/>
-          </p:cNvSpPr>
-          <p:nvPr>
-            <p:ph type="sldNum" sz="quarter" idx="10"/>
-          </p:nvPr>
-        </p:nvSpPr>
-        <p:spPr/>
-        <p:txBody>
-          <a:bodyPr/>
-          <a:lstStyle/>
-          <a:p>
-            <a:fld id="{4CFD207A-07DF-40AD-A916-9872E089CE7A}" type="slidenum">
-              <a:rPr lang="en-US" smtClean="0"/>
-              <a:t>20</a:t>
-            </a:fld>
-            <a:endParaRPr lang="en-US"/>
-          </a:p>
-        </p:txBody>
-      </p:sp>
-    </p:spTree>
-    <p:extLst>
-      <p:ext uri="{BB962C8B-B14F-4D97-AF65-F5344CB8AC3E}">
-        <p14:creationId xmlns:p14="http://schemas.microsoft.com/office/powerpoint/2010/main" val="3848024938"/>
       </p:ext>
     </p:extLst>
   </p:cSld>
@@ -4279,11 +3839,7 @@
           <a:p>
             <a:r>
               <a:rPr lang="en-US" dirty="0" smtClean="0"/>
-              <a:t>Christopher </a:t>
-            </a:r>
-            <a:r>
-              <a:rPr lang="en-US" dirty="0" smtClean="0"/>
-              <a:t>Harrison</a:t>
+              <a:t>Christopher Harrison</a:t>
             </a:r>
           </a:p>
           <a:p>
@@ -4542,1026 +4098,24 @@
           <a:chExt cx="0" cy="0"/>
         </a:xfrm>
       </p:grpSpPr>
-      <p:sp>
-        <p:nvSpPr>
-          <p:cNvPr id="6" name="Text Placeholder 5"/>
-          <p:cNvSpPr>
-            <a:spLocks noGrp="1"/>
-          </p:cNvSpPr>
-          <p:nvPr>
-            <p:ph type="body" sz="quarter" idx="10"/>
-          </p:nvPr>
-        </p:nvSpPr>
-        <p:spPr/>
-        <p:txBody>
-          <a:bodyPr/>
-          <a:lstStyle/>
-          <a:p>
-            <a:r>
-              <a:rPr lang="en-US" dirty="0" smtClean="0"/>
-              <a:t>Responsive Layout</a:t>
-            </a:r>
-            <a:endParaRPr lang="en-US" dirty="0"/>
-          </a:p>
-        </p:txBody>
-      </p:sp>
-      <p:sp>
-        <p:nvSpPr>
-          <p:cNvPr id="5" name="Subtitle 4"/>
-          <p:cNvSpPr>
-            <a:spLocks noGrp="1"/>
-          </p:cNvSpPr>
-          <p:nvPr>
-            <p:ph type="subTitle" idx="1"/>
-          </p:nvPr>
-        </p:nvSpPr>
-        <p:spPr/>
-        <p:txBody>
-          <a:bodyPr/>
-          <a:lstStyle/>
-          <a:p>
-            <a:endParaRPr lang="en-US"/>
-          </a:p>
-        </p:txBody>
-      </p:sp>
     </p:spTree>
     <p:extLst>
       <p:ext uri="{BB962C8B-B14F-4D97-AF65-F5344CB8AC3E}">
-        <p14:creationId xmlns:p14="http://schemas.microsoft.com/office/powerpoint/2010/main" val="2270932572"/>
+        <p14:creationId xmlns:p14="http://schemas.microsoft.com/office/powerpoint/2010/main" val="13701683"/>
       </p:ext>
     </p:extLst>
   </p:cSld>
   <p:clrMapOvr>
     <a:masterClrMapping/>
   </p:clrMapOvr>
-  <p:timing>
-    <p:tnLst>
-      <p:par>
-        <p:cTn id="1" dur="indefinite" restart="never" nodeType="tmRoot"/>
-      </p:par>
-    </p:tnLst>
-  </p:timing>
-</p:sld>
-</file>
-
-<file path=ppt/slides/slide14.xml><?xml version="1.0" encoding="utf-8"?>
-<p:sld xmlns:a="http://schemas.openxmlformats.org/drawingml/2006/main" xmlns:r="http://schemas.openxmlformats.org/officeDocument/2006/relationships" xmlns:p="http://schemas.openxmlformats.org/presentationml/2006/main">
-  <p:cSld>
-    <p:spTree>
-      <p:nvGrpSpPr>
-        <p:cNvPr id="1" name=""/>
-        <p:cNvGrpSpPr/>
-        <p:nvPr/>
-      </p:nvGrpSpPr>
-      <p:grpSpPr>
-        <a:xfrm>
-          <a:off x="0" y="0"/>
-          <a:ext cx="0" cy="0"/>
-          <a:chOff x="0" y="0"/>
-          <a:chExt cx="0" cy="0"/>
-        </a:xfrm>
-      </p:grpSpPr>
-      <p:sp>
-        <p:nvSpPr>
-          <p:cNvPr id="2" name="Title 1"/>
-          <p:cNvSpPr>
-            <a:spLocks noGrp="1"/>
-          </p:cNvSpPr>
-          <p:nvPr>
-            <p:ph type="title"/>
-          </p:nvPr>
-        </p:nvSpPr>
-        <p:spPr/>
-        <p:txBody>
-          <a:bodyPr/>
-          <a:lstStyle/>
-          <a:p>
-            <a:r>
-              <a:rPr lang="en-US" dirty="0" smtClean="0"/>
-              <a:t>Responsive Layout</a:t>
-            </a:r>
-            <a:endParaRPr lang="en-US" dirty="0"/>
-          </a:p>
-        </p:txBody>
-      </p:sp>
-      <p:pic>
-        <p:nvPicPr>
-          <p:cNvPr id="4" name="Content Placeholder 3" descr="Screen Clipping"/>
-          <p:cNvPicPr>
-            <a:picLocks noGrp="1" noChangeAspect="1"/>
-          </p:cNvPicPr>
-          <p:nvPr>
-            <p:ph sz="quarter" idx="10"/>
-          </p:nvPr>
-        </p:nvPicPr>
-        <p:blipFill>
-          <a:blip r:embed="rId2">
-            <a:extLst>
-              <a:ext uri="{28A0092B-C50C-407E-A947-70E740481C1C}">
-                <a14:useLocalDpi xmlns:a14="http://schemas.microsoft.com/office/drawing/2010/main" val="0"/>
-              </a:ext>
-            </a:extLst>
-          </a:blip>
-          <a:stretch>
-            <a:fillRect/>
-          </a:stretch>
-        </p:blipFill>
-        <p:spPr>
-          <a:xfrm>
-            <a:off x="3128113" y="1208989"/>
-            <a:ext cx="5935774" cy="4440022"/>
-          </a:xfrm>
-        </p:spPr>
-      </p:pic>
-    </p:spTree>
-    <p:extLst>
-      <p:ext uri="{BB962C8B-B14F-4D97-AF65-F5344CB8AC3E}">
-        <p14:creationId xmlns:p14="http://schemas.microsoft.com/office/powerpoint/2010/main" val="2170777001"/>
-      </p:ext>
-    </p:extLst>
-  </p:cSld>
-  <p:clrMapOvr>
-    <a:masterClrMapping/>
-  </p:clrMapOvr>
-  <p:timing>
-    <p:tnLst>
-      <p:par>
-        <p:cTn id="1" dur="indefinite" restart="never" nodeType="tmRoot"/>
-      </p:par>
-    </p:tnLst>
-  </p:timing>
-</p:sld>
-</file>
-
-<file path=ppt/slides/slide15.xml><?xml version="1.0" encoding="utf-8"?>
-<p:sld xmlns:a="http://schemas.openxmlformats.org/drawingml/2006/main" xmlns:r="http://schemas.openxmlformats.org/officeDocument/2006/relationships" xmlns:p="http://schemas.openxmlformats.org/presentationml/2006/main">
-  <p:cSld>
-    <p:spTree>
-      <p:nvGrpSpPr>
-        <p:cNvPr id="1" name=""/>
-        <p:cNvGrpSpPr/>
-        <p:nvPr/>
-      </p:nvGrpSpPr>
-      <p:grpSpPr>
-        <a:xfrm>
-          <a:off x="0" y="0"/>
-          <a:ext cx="0" cy="0"/>
-          <a:chOff x="0" y="0"/>
-          <a:chExt cx="0" cy="0"/>
-        </a:xfrm>
-      </p:grpSpPr>
-      <p:sp>
-        <p:nvSpPr>
-          <p:cNvPr id="2" name="Title 1"/>
-          <p:cNvSpPr>
-            <a:spLocks noGrp="1"/>
-          </p:cNvSpPr>
-          <p:nvPr>
-            <p:ph type="title"/>
-          </p:nvPr>
-        </p:nvSpPr>
-        <p:spPr/>
-        <p:txBody>
-          <a:bodyPr/>
-          <a:lstStyle/>
-          <a:p>
-            <a:r>
-              <a:rPr lang="en-US" dirty="0" smtClean="0"/>
-              <a:t>Responsive Layout</a:t>
-            </a:r>
-            <a:endParaRPr lang="en-US" dirty="0"/>
-          </a:p>
-        </p:txBody>
-      </p:sp>
-      <p:pic>
-        <p:nvPicPr>
-          <p:cNvPr id="3" name="Picture 2"/>
-          <p:cNvPicPr>
-            <a:picLocks noChangeAspect="1"/>
-          </p:cNvPicPr>
-          <p:nvPr/>
-        </p:nvPicPr>
-        <p:blipFill>
-          <a:blip r:embed="rId2">
-            <a:extLst>
-              <a:ext uri="{28A0092B-C50C-407E-A947-70E740481C1C}">
-                <a14:useLocalDpi xmlns:a14="http://schemas.microsoft.com/office/drawing/2010/main" val="0"/>
-              </a:ext>
-            </a:extLst>
-          </a:blip>
-          <a:stretch>
-            <a:fillRect/>
-          </a:stretch>
-        </p:blipFill>
-        <p:spPr>
-          <a:xfrm>
-            <a:off x="9009870" y="1289634"/>
-            <a:ext cx="2342071" cy="4264214"/>
-          </a:xfrm>
-          <a:prstGeom prst="rect">
-            <a:avLst/>
-          </a:prstGeom>
-        </p:spPr>
-      </p:pic>
-      <p:pic>
-        <p:nvPicPr>
-          <p:cNvPr id="5" name="Picture 4"/>
-          <p:cNvPicPr>
-            <a:picLocks noChangeAspect="1"/>
-          </p:cNvPicPr>
-          <p:nvPr/>
-        </p:nvPicPr>
-        <p:blipFill>
-          <a:blip r:embed="rId3">
-            <a:extLst>
-              <a:ext uri="{28A0092B-C50C-407E-A947-70E740481C1C}">
-                <a14:useLocalDpi xmlns:a14="http://schemas.microsoft.com/office/drawing/2010/main" val="0"/>
-              </a:ext>
-            </a:extLst>
-          </a:blip>
-          <a:stretch>
-            <a:fillRect/>
-          </a:stretch>
-        </p:blipFill>
-        <p:spPr>
-          <a:xfrm>
-            <a:off x="847865" y="1245702"/>
-            <a:ext cx="6029184" cy="4308146"/>
-          </a:xfrm>
-          <a:prstGeom prst="rect">
-            <a:avLst/>
-          </a:prstGeom>
-        </p:spPr>
-      </p:pic>
-    </p:spTree>
-    <p:extLst>
-      <p:ext uri="{BB962C8B-B14F-4D97-AF65-F5344CB8AC3E}">
-        <p14:creationId xmlns:p14="http://schemas.microsoft.com/office/powerpoint/2010/main" val="1421809041"/>
-      </p:ext>
-    </p:extLst>
-  </p:cSld>
-  <p:clrMapOvr>
-    <a:masterClrMapping/>
-  </p:clrMapOvr>
-  <p:timing>
-    <p:tnLst>
-      <p:par>
-        <p:cTn id="1" dur="indefinite" restart="never" nodeType="tmRoot"/>
-      </p:par>
-    </p:tnLst>
-  </p:timing>
-</p:sld>
-</file>
-
-<file path=ppt/slides/slide16.xml><?xml version="1.0" encoding="utf-8"?>
-<p:sld xmlns:a="http://schemas.openxmlformats.org/drawingml/2006/main" xmlns:r="http://schemas.openxmlformats.org/officeDocument/2006/relationships" xmlns:p="http://schemas.openxmlformats.org/presentationml/2006/main">
-  <p:cSld>
-    <p:spTree>
-      <p:nvGrpSpPr>
-        <p:cNvPr id="1" name=""/>
-        <p:cNvGrpSpPr/>
-        <p:nvPr/>
-      </p:nvGrpSpPr>
-      <p:grpSpPr>
-        <a:xfrm>
-          <a:off x="0" y="0"/>
-          <a:ext cx="0" cy="0"/>
-          <a:chOff x="0" y="0"/>
-          <a:chExt cx="0" cy="0"/>
-        </a:xfrm>
-      </p:grpSpPr>
-      <p:sp>
-        <p:nvSpPr>
-          <p:cNvPr id="2" name="Title 1"/>
-          <p:cNvSpPr>
-            <a:spLocks noGrp="1"/>
-          </p:cNvSpPr>
-          <p:nvPr>
-            <p:ph type="title"/>
-          </p:nvPr>
-        </p:nvSpPr>
-        <p:spPr/>
-        <p:txBody>
-          <a:bodyPr/>
-          <a:lstStyle/>
-          <a:p>
-            <a:r>
-              <a:rPr lang="en-US" dirty="0" smtClean="0"/>
-              <a:t>Responsive UI</a:t>
-            </a:r>
-            <a:endParaRPr lang="en-US" dirty="0"/>
-          </a:p>
-        </p:txBody>
-      </p:sp>
-    </p:spTree>
-    <p:extLst>
-      <p:ext uri="{BB962C8B-B14F-4D97-AF65-F5344CB8AC3E}">
-        <p14:creationId xmlns:p14="http://schemas.microsoft.com/office/powerpoint/2010/main" val="2244557142"/>
-      </p:ext>
-    </p:extLst>
-  </p:cSld>
-  <p:clrMapOvr>
-    <a:masterClrMapping/>
-  </p:clrMapOvr>
-  <p:timing>
-    <p:tnLst>
-      <p:par>
-        <p:cTn id="1" dur="indefinite" restart="never" nodeType="tmRoot"/>
-      </p:par>
-    </p:tnLst>
-  </p:timing>
-</p:sld>
-</file>
-
-<file path=ppt/slides/slide17.xml><?xml version="1.0" encoding="utf-8"?>
-<p:sld xmlns:a="http://schemas.openxmlformats.org/drawingml/2006/main" xmlns:r="http://schemas.openxmlformats.org/officeDocument/2006/relationships" xmlns:p="http://schemas.openxmlformats.org/presentationml/2006/main">
-  <p:cSld>
-    <p:spTree>
-      <p:nvGrpSpPr>
-        <p:cNvPr id="1" name=""/>
-        <p:cNvGrpSpPr/>
-        <p:nvPr/>
-      </p:nvGrpSpPr>
-      <p:grpSpPr>
-        <a:xfrm>
-          <a:off x="0" y="0"/>
-          <a:ext cx="0" cy="0"/>
-          <a:chOff x="0" y="0"/>
-          <a:chExt cx="0" cy="0"/>
-        </a:xfrm>
-      </p:grpSpPr>
-      <p:sp>
-        <p:nvSpPr>
-          <p:cNvPr id="6" name="Text Placeholder 5"/>
-          <p:cNvSpPr>
-            <a:spLocks noGrp="1"/>
-          </p:cNvSpPr>
-          <p:nvPr>
-            <p:ph type="body" sz="quarter" idx="10"/>
-          </p:nvPr>
-        </p:nvSpPr>
-        <p:spPr/>
-        <p:txBody>
-          <a:bodyPr/>
-          <a:lstStyle/>
-          <a:p>
-            <a:r>
-              <a:rPr lang="en-US" dirty="0" smtClean="0"/>
-              <a:t>Grid System</a:t>
-            </a:r>
-            <a:endParaRPr lang="en-US" dirty="0"/>
-          </a:p>
-        </p:txBody>
-      </p:sp>
-      <p:sp>
-        <p:nvSpPr>
-          <p:cNvPr id="5" name="Subtitle 4"/>
-          <p:cNvSpPr>
-            <a:spLocks noGrp="1"/>
-          </p:cNvSpPr>
-          <p:nvPr>
-            <p:ph type="subTitle" idx="1"/>
-          </p:nvPr>
-        </p:nvSpPr>
-        <p:spPr/>
-        <p:txBody>
-          <a:bodyPr/>
-          <a:lstStyle/>
-          <a:p>
-            <a:endParaRPr lang="en-US"/>
-          </a:p>
-        </p:txBody>
-      </p:sp>
-    </p:spTree>
-    <p:extLst>
-      <p:ext uri="{BB962C8B-B14F-4D97-AF65-F5344CB8AC3E}">
-        <p14:creationId xmlns:p14="http://schemas.microsoft.com/office/powerpoint/2010/main" val="3906792813"/>
-      </p:ext>
-    </p:extLst>
-  </p:cSld>
-  <p:clrMapOvr>
-    <a:masterClrMapping/>
-  </p:clrMapOvr>
-  <p:timing>
-    <p:tnLst>
-      <p:par>
-        <p:cTn id="1" dur="indefinite" restart="never" nodeType="tmRoot"/>
-      </p:par>
-    </p:tnLst>
-  </p:timing>
-</p:sld>
-</file>
-
-<file path=ppt/slides/slide18.xml><?xml version="1.0" encoding="utf-8"?>
-<p:sld xmlns:a="http://schemas.openxmlformats.org/drawingml/2006/main" xmlns:r="http://schemas.openxmlformats.org/officeDocument/2006/relationships" xmlns:p="http://schemas.openxmlformats.org/presentationml/2006/main">
-  <p:cSld>
-    <p:spTree>
-      <p:nvGrpSpPr>
-        <p:cNvPr id="1" name=""/>
-        <p:cNvGrpSpPr/>
-        <p:nvPr/>
-      </p:nvGrpSpPr>
-      <p:grpSpPr>
-        <a:xfrm>
-          <a:off x="0" y="0"/>
-          <a:ext cx="0" cy="0"/>
-          <a:chOff x="0" y="0"/>
-          <a:chExt cx="0" cy="0"/>
-        </a:xfrm>
-      </p:grpSpPr>
-      <p:sp>
-        <p:nvSpPr>
-          <p:cNvPr id="2" name="Title 1"/>
-          <p:cNvSpPr>
-            <a:spLocks noGrp="1"/>
-          </p:cNvSpPr>
-          <p:nvPr>
-            <p:ph type="title"/>
-          </p:nvPr>
-        </p:nvSpPr>
-        <p:spPr/>
-        <p:txBody>
-          <a:bodyPr/>
-          <a:lstStyle/>
-          <a:p>
-            <a:r>
-              <a:rPr lang="en-US" dirty="0" smtClean="0"/>
-              <a:t>Grid system</a:t>
-            </a:r>
-            <a:endParaRPr lang="en-US" dirty="0"/>
-          </a:p>
-        </p:txBody>
-      </p:sp>
-      <p:graphicFrame>
-        <p:nvGraphicFramePr>
-          <p:cNvPr id="7" name="Content Placeholder 6"/>
-          <p:cNvGraphicFramePr>
-            <a:graphicFrameLocks noGrp="1"/>
-          </p:cNvGraphicFramePr>
-          <p:nvPr>
-            <p:ph sz="quarter" idx="10"/>
-            <p:extLst/>
-          </p:nvPr>
-        </p:nvGraphicFramePr>
-        <p:xfrm>
-          <a:off x="680225" y="1750740"/>
-          <a:ext cx="10786520" cy="4115564"/>
-        </p:xfrm>
-        <a:graphic>
-          <a:graphicData uri="http://schemas.openxmlformats.org/drawingml/2006/table">
-            <a:tbl>
-              <a:tblPr firstRow="1">
-                <a:tableStyleId>{B301B821-A1FF-4177-AEE7-76D212191A09}</a:tableStyleId>
-              </a:tblPr>
-              <a:tblGrid>
-                <a:gridCol w="2157304"/>
-                <a:gridCol w="2157304"/>
-                <a:gridCol w="2157304"/>
-                <a:gridCol w="2157304"/>
-                <a:gridCol w="2157304"/>
-              </a:tblGrid>
-              <a:tr h="847322">
-                <a:tc>
-                  <a:txBody>
-                    <a:bodyPr/>
-                    <a:lstStyle/>
-                    <a:p>
-                      <a:endParaRPr lang="en-US" dirty="0"/>
-                    </a:p>
-                  </a:txBody>
-                  <a:tcPr anchor="ctr"/>
-                </a:tc>
-                <a:tc>
-                  <a:txBody>
-                    <a:bodyPr/>
-                    <a:lstStyle/>
-                    <a:p>
-                      <a:r>
-                        <a:rPr lang="en-US"/>
-                        <a:t>Extra small devices Phones (&lt;768px) </a:t>
-                      </a:r>
-                    </a:p>
-                  </a:txBody>
-                  <a:tcPr anchor="ctr"/>
-                </a:tc>
-                <a:tc>
-                  <a:txBody>
-                    <a:bodyPr/>
-                    <a:lstStyle/>
-                    <a:p>
-                      <a:r>
-                        <a:rPr lang="en-US"/>
-                        <a:t>Small devices Tablets (≥768px) </a:t>
-                      </a:r>
-                    </a:p>
-                  </a:txBody>
-                  <a:tcPr anchor="ctr"/>
-                </a:tc>
-                <a:tc>
-                  <a:txBody>
-                    <a:bodyPr/>
-                    <a:lstStyle/>
-                    <a:p>
-                      <a:r>
-                        <a:rPr lang="en-US"/>
-                        <a:t>Medium devices Desktops (≥992px) </a:t>
-                      </a:r>
-                    </a:p>
-                  </a:txBody>
-                  <a:tcPr anchor="ctr"/>
-                </a:tc>
-                <a:tc>
-                  <a:txBody>
-                    <a:bodyPr/>
-                    <a:lstStyle/>
-                    <a:p>
-                      <a:r>
-                        <a:rPr lang="en-US"/>
-                        <a:t>Large devices Desktops (≥1200px) </a:t>
-                      </a:r>
-                    </a:p>
-                  </a:txBody>
-                  <a:tcPr anchor="ctr"/>
-                </a:tc>
-              </a:tr>
-              <a:tr h="847322">
-                <a:tc>
-                  <a:txBody>
-                    <a:bodyPr/>
-                    <a:lstStyle/>
-                    <a:p>
-                      <a:r>
-                        <a:rPr lang="en-US"/>
-                        <a:t>Grid behavior</a:t>
-                      </a:r>
-                    </a:p>
-                  </a:txBody>
-                  <a:tcPr anchor="ctr"/>
-                </a:tc>
-                <a:tc>
-                  <a:txBody>
-                    <a:bodyPr/>
-                    <a:lstStyle/>
-                    <a:p>
-                      <a:r>
-                        <a:rPr lang="en-US"/>
-                        <a:t>Horizontal at all times</a:t>
-                      </a:r>
-                    </a:p>
-                  </a:txBody>
-                  <a:tcPr anchor="ctr"/>
-                </a:tc>
-                <a:tc gridSpan="3">
-                  <a:txBody>
-                    <a:bodyPr/>
-                    <a:lstStyle/>
-                    <a:p>
-                      <a:r>
-                        <a:rPr lang="en-US"/>
-                        <a:t>Collapsed to start, horizontal above breakpoints</a:t>
-                      </a:r>
-                    </a:p>
-                  </a:txBody>
-                  <a:tcPr anchor="ctr"/>
-                </a:tc>
-                <a:tc hMerge="1">
-                  <a:txBody>
-                    <a:bodyPr/>
-                    <a:lstStyle/>
-                    <a:p>
-                      <a:endParaRPr lang="en-US"/>
-                    </a:p>
-                  </a:txBody>
-                  <a:tcPr/>
-                </a:tc>
-                <a:tc hMerge="1">
-                  <a:txBody>
-                    <a:bodyPr/>
-                    <a:lstStyle/>
-                    <a:p>
-                      <a:endParaRPr lang="en-US"/>
-                    </a:p>
-                  </a:txBody>
-                  <a:tcPr/>
-                </a:tc>
-              </a:tr>
-              <a:tr h="484184">
-                <a:tc>
-                  <a:txBody>
-                    <a:bodyPr/>
-                    <a:lstStyle/>
-                    <a:p>
-                      <a:r>
-                        <a:rPr lang="en-US"/>
-                        <a:t>Container width</a:t>
-                      </a:r>
-                    </a:p>
-                  </a:txBody>
-                  <a:tcPr anchor="ctr"/>
-                </a:tc>
-                <a:tc>
-                  <a:txBody>
-                    <a:bodyPr/>
-                    <a:lstStyle/>
-                    <a:p>
-                      <a:r>
-                        <a:rPr lang="en-US"/>
-                        <a:t>None (auto)</a:t>
-                      </a:r>
-                    </a:p>
-                  </a:txBody>
-                  <a:tcPr anchor="ctr"/>
-                </a:tc>
-                <a:tc>
-                  <a:txBody>
-                    <a:bodyPr/>
-                    <a:lstStyle/>
-                    <a:p>
-                      <a:r>
-                        <a:rPr lang="en-US"/>
-                        <a:t>750px</a:t>
-                      </a:r>
-                    </a:p>
-                  </a:txBody>
-                  <a:tcPr anchor="ctr"/>
-                </a:tc>
-                <a:tc>
-                  <a:txBody>
-                    <a:bodyPr/>
-                    <a:lstStyle/>
-                    <a:p>
-                      <a:r>
-                        <a:rPr lang="en-US"/>
-                        <a:t>970px</a:t>
-                      </a:r>
-                    </a:p>
-                  </a:txBody>
-                  <a:tcPr anchor="ctr"/>
-                </a:tc>
-                <a:tc>
-                  <a:txBody>
-                    <a:bodyPr/>
-                    <a:lstStyle/>
-                    <a:p>
-                      <a:r>
-                        <a:rPr lang="en-US"/>
-                        <a:t>1170px</a:t>
-                      </a:r>
-                    </a:p>
-                  </a:txBody>
-                  <a:tcPr anchor="ctr"/>
-                </a:tc>
-              </a:tr>
-              <a:tr h="484184">
-                <a:tc>
-                  <a:txBody>
-                    <a:bodyPr/>
-                    <a:lstStyle/>
-                    <a:p>
-                      <a:r>
-                        <a:rPr lang="en-US"/>
-                        <a:t>Class prefix</a:t>
-                      </a:r>
-                    </a:p>
-                  </a:txBody>
-                  <a:tcPr anchor="ctr"/>
-                </a:tc>
-                <a:tc>
-                  <a:txBody>
-                    <a:bodyPr/>
-                    <a:lstStyle/>
-                    <a:p>
-                      <a:r>
-                        <a:rPr lang="en-US"/>
-                        <a:t>.col-xs-</a:t>
-                      </a:r>
-                    </a:p>
-                  </a:txBody>
-                  <a:tcPr anchor="ctr"/>
-                </a:tc>
-                <a:tc>
-                  <a:txBody>
-                    <a:bodyPr/>
-                    <a:lstStyle/>
-                    <a:p>
-                      <a:r>
-                        <a:rPr lang="en-US"/>
-                        <a:t>.col-sm-</a:t>
-                      </a:r>
-                    </a:p>
-                  </a:txBody>
-                  <a:tcPr anchor="ctr"/>
-                </a:tc>
-                <a:tc>
-                  <a:txBody>
-                    <a:bodyPr/>
-                    <a:lstStyle/>
-                    <a:p>
-                      <a:r>
-                        <a:rPr lang="en-US"/>
-                        <a:t>.col-md-</a:t>
-                      </a:r>
-                    </a:p>
-                  </a:txBody>
-                  <a:tcPr anchor="ctr"/>
-                </a:tc>
-                <a:tc>
-                  <a:txBody>
-                    <a:bodyPr/>
-                    <a:lstStyle/>
-                    <a:p>
-                      <a:r>
-                        <a:rPr lang="en-US"/>
-                        <a:t>.col-lg-</a:t>
-                      </a:r>
-                    </a:p>
-                  </a:txBody>
-                  <a:tcPr anchor="ctr"/>
-                </a:tc>
-              </a:tr>
-              <a:tr h="484184">
-                <a:tc>
-                  <a:txBody>
-                    <a:bodyPr/>
-                    <a:lstStyle/>
-                    <a:p>
-                      <a:r>
-                        <a:rPr lang="en-US" dirty="0"/>
-                        <a:t># of columns</a:t>
-                      </a:r>
-                    </a:p>
-                  </a:txBody>
-                  <a:tcPr anchor="ctr"/>
-                </a:tc>
-                <a:tc gridSpan="4">
-                  <a:txBody>
-                    <a:bodyPr/>
-                    <a:lstStyle/>
-                    <a:p>
-                      <a:r>
-                        <a:rPr lang="en-US" dirty="0"/>
-                        <a:t>12</a:t>
-                      </a:r>
-                    </a:p>
-                  </a:txBody>
-                  <a:tcPr anchor="ctr"/>
-                </a:tc>
-                <a:tc hMerge="1">
-                  <a:txBody>
-                    <a:bodyPr/>
-                    <a:lstStyle/>
-                    <a:p>
-                      <a:endParaRPr lang="en-US"/>
-                    </a:p>
-                  </a:txBody>
-                  <a:tcPr/>
-                </a:tc>
-                <a:tc hMerge="1">
-                  <a:txBody>
-                    <a:bodyPr/>
-                    <a:lstStyle/>
-                    <a:p>
-                      <a:endParaRPr lang="en-US"/>
-                    </a:p>
-                  </a:txBody>
-                  <a:tcPr/>
-                </a:tc>
-                <a:tc hMerge="1">
-                  <a:txBody>
-                    <a:bodyPr/>
-                    <a:lstStyle/>
-                    <a:p>
-                      <a:endParaRPr lang="en-US"/>
-                    </a:p>
-                  </a:txBody>
-                  <a:tcPr/>
-                </a:tc>
-              </a:tr>
-              <a:tr h="484184">
-                <a:tc>
-                  <a:txBody>
-                    <a:bodyPr/>
-                    <a:lstStyle/>
-                    <a:p>
-                      <a:r>
-                        <a:rPr lang="en-US"/>
-                        <a:t>Column width</a:t>
-                      </a:r>
-                    </a:p>
-                  </a:txBody>
-                  <a:tcPr anchor="ctr"/>
-                </a:tc>
-                <a:tc>
-                  <a:txBody>
-                    <a:bodyPr/>
-                    <a:lstStyle/>
-                    <a:p>
-                      <a:r>
-                        <a:rPr lang="en-US"/>
-                        <a:t>Auto</a:t>
-                      </a:r>
-                    </a:p>
-                  </a:txBody>
-                  <a:tcPr anchor="ctr"/>
-                </a:tc>
-                <a:tc>
-                  <a:txBody>
-                    <a:bodyPr/>
-                    <a:lstStyle/>
-                    <a:p>
-                      <a:r>
-                        <a:rPr lang="en-US"/>
-                        <a:t>60px</a:t>
-                      </a:r>
-                    </a:p>
-                  </a:txBody>
-                  <a:tcPr anchor="ctr"/>
-                </a:tc>
-                <a:tc>
-                  <a:txBody>
-                    <a:bodyPr/>
-                    <a:lstStyle/>
-                    <a:p>
-                      <a:r>
-                        <a:rPr lang="en-US"/>
-                        <a:t>78px</a:t>
-                      </a:r>
-                    </a:p>
-                  </a:txBody>
-                  <a:tcPr anchor="ctr"/>
-                </a:tc>
-                <a:tc>
-                  <a:txBody>
-                    <a:bodyPr/>
-                    <a:lstStyle/>
-                    <a:p>
-                      <a:r>
-                        <a:rPr lang="en-US"/>
-                        <a:t>95px</a:t>
-                      </a:r>
-                    </a:p>
-                  </a:txBody>
-                  <a:tcPr anchor="ctr"/>
-                </a:tc>
-              </a:tr>
-              <a:tr h="484184">
-                <a:tc>
-                  <a:txBody>
-                    <a:bodyPr/>
-                    <a:lstStyle/>
-                    <a:p>
-                      <a:r>
-                        <a:rPr lang="en-US"/>
-                        <a:t>Gutter width</a:t>
-                      </a:r>
-                    </a:p>
-                  </a:txBody>
-                  <a:tcPr anchor="ctr"/>
-                </a:tc>
-                <a:tc gridSpan="4">
-                  <a:txBody>
-                    <a:bodyPr/>
-                    <a:lstStyle/>
-                    <a:p>
-                      <a:r>
-                        <a:rPr lang="en-US" dirty="0"/>
-                        <a:t>30px (15px on each side of a column)</a:t>
-                      </a:r>
-                    </a:p>
-                  </a:txBody>
-                  <a:tcPr anchor="ctr"/>
-                </a:tc>
-                <a:tc hMerge="1">
-                  <a:txBody>
-                    <a:bodyPr/>
-                    <a:lstStyle/>
-                    <a:p>
-                      <a:endParaRPr lang="en-US"/>
-                    </a:p>
-                  </a:txBody>
-                  <a:tcPr/>
-                </a:tc>
-                <a:tc hMerge="1">
-                  <a:txBody>
-                    <a:bodyPr/>
-                    <a:lstStyle/>
-                    <a:p>
-                      <a:endParaRPr lang="en-US"/>
-                    </a:p>
-                  </a:txBody>
-                  <a:tcPr/>
-                </a:tc>
-                <a:tc hMerge="1">
-                  <a:txBody>
-                    <a:bodyPr/>
-                    <a:lstStyle/>
-                    <a:p>
-                      <a:endParaRPr lang="en-US"/>
-                    </a:p>
-                  </a:txBody>
-                  <a:tcPr/>
-                </a:tc>
-              </a:tr>
-            </a:tbl>
-          </a:graphicData>
-        </a:graphic>
-      </p:graphicFrame>
-    </p:spTree>
-    <p:extLst>
-      <p:ext uri="{BB962C8B-B14F-4D97-AF65-F5344CB8AC3E}">
-        <p14:creationId xmlns:p14="http://schemas.microsoft.com/office/powerpoint/2010/main" val="2660576857"/>
-      </p:ext>
-    </p:extLst>
-  </p:cSld>
-  <p:clrMapOvr>
-    <a:masterClrMapping/>
-  </p:clrMapOvr>
-  <p:timing>
-    <p:tnLst>
-      <p:par>
-        <p:cTn id="1" dur="indefinite" restart="never" nodeType="tmRoot"/>
-      </p:par>
-    </p:tnLst>
-  </p:timing>
-</p:sld>
-</file>
-
-<file path=ppt/slides/slide19.xml><?xml version="1.0" encoding="utf-8"?>
-<p:sld xmlns:a="http://schemas.openxmlformats.org/drawingml/2006/main" xmlns:r="http://schemas.openxmlformats.org/officeDocument/2006/relationships" xmlns:p="http://schemas.openxmlformats.org/presentationml/2006/main">
-  <p:cSld>
-    <p:spTree>
-      <p:nvGrpSpPr>
-        <p:cNvPr id="1" name=""/>
-        <p:cNvGrpSpPr/>
-        <p:nvPr/>
-      </p:nvGrpSpPr>
-      <p:grpSpPr>
-        <a:xfrm>
-          <a:off x="0" y="0"/>
-          <a:ext cx="0" cy="0"/>
-          <a:chOff x="0" y="0"/>
-          <a:chExt cx="0" cy="0"/>
-        </a:xfrm>
-      </p:grpSpPr>
-      <p:sp>
-        <p:nvSpPr>
-          <p:cNvPr id="2" name="Title 1"/>
-          <p:cNvSpPr>
-            <a:spLocks noGrp="1"/>
-          </p:cNvSpPr>
-          <p:nvPr>
-            <p:ph type="title"/>
-          </p:nvPr>
-        </p:nvSpPr>
-        <p:spPr/>
-        <p:txBody>
-          <a:bodyPr/>
-          <a:lstStyle/>
-          <a:p>
-            <a:r>
-              <a:rPr lang="en-US" dirty="0" smtClean="0"/>
-              <a:t>Grid system</a:t>
-            </a:r>
-            <a:endParaRPr lang="en-US" dirty="0"/>
-          </a:p>
-        </p:txBody>
-      </p:sp>
-      <p:pic>
-        <p:nvPicPr>
-          <p:cNvPr id="4" name="Content Placeholder 3"/>
-          <p:cNvPicPr>
-            <a:picLocks noGrp="1" noChangeAspect="1"/>
-          </p:cNvPicPr>
-          <p:nvPr>
-            <p:ph sz="quarter" idx="10"/>
-          </p:nvPr>
-        </p:nvPicPr>
-        <p:blipFill>
-          <a:blip r:embed="rId2"/>
-          <a:stretch>
-            <a:fillRect/>
-          </a:stretch>
-        </p:blipFill>
-        <p:spPr>
-          <a:xfrm>
-            <a:off x="379514" y="2276273"/>
-            <a:ext cx="11509095" cy="3151761"/>
-          </a:xfrm>
-          <a:prstGeom prst="rect">
-            <a:avLst/>
-          </a:prstGeom>
-        </p:spPr>
-      </p:pic>
-    </p:spTree>
-    <p:extLst>
-      <p:ext uri="{BB962C8B-B14F-4D97-AF65-F5344CB8AC3E}">
-        <p14:creationId xmlns:p14="http://schemas.microsoft.com/office/powerpoint/2010/main" val="3100173437"/>
-      </p:ext>
-    </p:extLst>
-  </p:cSld>
-  <p:clrMapOvr>
-    <a:masterClrMapping/>
-  </p:clrMapOvr>
+  <mc:AlternateContent xmlns:mc="http://schemas.openxmlformats.org/markup-compatibility/2006" xmlns:p14="http://schemas.microsoft.com/office/powerpoint/2010/main">
+    <mc:Choice Requires="p14">
+      <p:transition spd="slow" p14:dur="2000"/>
+    </mc:Choice>
+    <mc:Fallback xmlns="">
+      <p:transition spd="slow"/>
+    </mc:Fallback>
+  </mc:AlternateContent>
   <p:timing>
     <p:tnLst>
       <p:par>
@@ -5691,426 +4245,6 @@
   <p:clrMapOvr>
     <a:masterClrMapping/>
   </p:clrMapOvr>
-  <p:timing>
-    <p:tnLst>
-      <p:par>
-        <p:cTn id="1" dur="indefinite" restart="never" nodeType="tmRoot"/>
-      </p:par>
-    </p:tnLst>
-  </p:timing>
-</p:sld>
-</file>
-
-<file path=ppt/slides/slide20.xml><?xml version="1.0" encoding="utf-8"?>
-<p:sld xmlns:a="http://schemas.openxmlformats.org/drawingml/2006/main" xmlns:r="http://schemas.openxmlformats.org/officeDocument/2006/relationships" xmlns:p="http://schemas.openxmlformats.org/presentationml/2006/main">
-  <p:cSld>
-    <p:spTree>
-      <p:nvGrpSpPr>
-        <p:cNvPr id="1" name=""/>
-        <p:cNvGrpSpPr/>
-        <p:nvPr/>
-      </p:nvGrpSpPr>
-      <p:grpSpPr>
-        <a:xfrm>
-          <a:off x="0" y="0"/>
-          <a:ext cx="0" cy="0"/>
-          <a:chOff x="0" y="0"/>
-          <a:chExt cx="0" cy="0"/>
-        </a:xfrm>
-      </p:grpSpPr>
-      <p:sp>
-        <p:nvSpPr>
-          <p:cNvPr id="2" name="Title 1"/>
-          <p:cNvSpPr>
-            <a:spLocks noGrp="1"/>
-          </p:cNvSpPr>
-          <p:nvPr>
-            <p:ph type="title"/>
-          </p:nvPr>
-        </p:nvSpPr>
-        <p:spPr/>
-        <p:txBody>
-          <a:bodyPr/>
-          <a:lstStyle/>
-          <a:p>
-            <a:r>
-              <a:rPr lang="en-US" dirty="0" smtClean="0"/>
-              <a:t>Grid system</a:t>
-            </a:r>
-            <a:endParaRPr lang="en-US" dirty="0"/>
-          </a:p>
-        </p:txBody>
-      </p:sp>
-    </p:spTree>
-    <p:extLst>
-      <p:ext uri="{BB962C8B-B14F-4D97-AF65-F5344CB8AC3E}">
-        <p14:creationId xmlns:p14="http://schemas.microsoft.com/office/powerpoint/2010/main" val="2591883282"/>
-      </p:ext>
-    </p:extLst>
-  </p:cSld>
-  <p:clrMapOvr>
-    <a:masterClrMapping/>
-  </p:clrMapOvr>
-  <p:timing>
-    <p:tnLst>
-      <p:par>
-        <p:cTn id="1" dur="indefinite" restart="never" nodeType="tmRoot"/>
-      </p:par>
-    </p:tnLst>
-  </p:timing>
-</p:sld>
-</file>
-
-<file path=ppt/slides/slide21.xml><?xml version="1.0" encoding="utf-8"?>
-<p:sld xmlns:a="http://schemas.openxmlformats.org/drawingml/2006/main" xmlns:r="http://schemas.openxmlformats.org/officeDocument/2006/relationships" xmlns:p="http://schemas.openxmlformats.org/presentationml/2006/main">
-  <p:cSld>
-    <p:spTree>
-      <p:nvGrpSpPr>
-        <p:cNvPr id="1" name=""/>
-        <p:cNvGrpSpPr/>
-        <p:nvPr/>
-      </p:nvGrpSpPr>
-      <p:grpSpPr>
-        <a:xfrm>
-          <a:off x="0" y="0"/>
-          <a:ext cx="0" cy="0"/>
-          <a:chOff x="0" y="0"/>
-          <a:chExt cx="0" cy="0"/>
-        </a:xfrm>
-      </p:grpSpPr>
-      <p:sp>
-        <p:nvSpPr>
-          <p:cNvPr id="6" name="Text Placeholder 5"/>
-          <p:cNvSpPr>
-            <a:spLocks noGrp="1"/>
-          </p:cNvSpPr>
-          <p:nvPr>
-            <p:ph type="body" sz="quarter" idx="10"/>
-          </p:nvPr>
-        </p:nvSpPr>
-        <p:spPr/>
-        <p:txBody>
-          <a:bodyPr/>
-          <a:lstStyle/>
-          <a:p>
-            <a:r>
-              <a:rPr lang="en-US" dirty="0" smtClean="0"/>
-              <a:t>Visual Studio support</a:t>
-            </a:r>
-            <a:endParaRPr lang="en-US" dirty="0"/>
-          </a:p>
-        </p:txBody>
-      </p:sp>
-      <p:sp>
-        <p:nvSpPr>
-          <p:cNvPr id="5" name="Subtitle 4"/>
-          <p:cNvSpPr>
-            <a:spLocks noGrp="1"/>
-          </p:cNvSpPr>
-          <p:nvPr>
-            <p:ph type="subTitle" idx="1"/>
-          </p:nvPr>
-        </p:nvSpPr>
-        <p:spPr/>
-        <p:txBody>
-          <a:bodyPr/>
-          <a:lstStyle/>
-          <a:p>
-            <a:endParaRPr lang="en-US"/>
-          </a:p>
-        </p:txBody>
-      </p:sp>
-    </p:spTree>
-    <p:extLst>
-      <p:ext uri="{BB962C8B-B14F-4D97-AF65-F5344CB8AC3E}">
-        <p14:creationId xmlns:p14="http://schemas.microsoft.com/office/powerpoint/2010/main" val="1488578929"/>
-      </p:ext>
-    </p:extLst>
-  </p:cSld>
-  <p:clrMapOvr>
-    <a:masterClrMapping/>
-  </p:clrMapOvr>
-  <p:timing>
-    <p:tnLst>
-      <p:par>
-        <p:cTn id="1" dur="indefinite" restart="never" nodeType="tmRoot"/>
-      </p:par>
-    </p:tnLst>
-  </p:timing>
-</p:sld>
-</file>
-
-<file path=ppt/slides/slide22.xml><?xml version="1.0" encoding="utf-8"?>
-<p:sld xmlns:a="http://schemas.openxmlformats.org/drawingml/2006/main" xmlns:r="http://schemas.openxmlformats.org/officeDocument/2006/relationships" xmlns:p="http://schemas.openxmlformats.org/presentationml/2006/main">
-  <p:cSld>
-    <p:spTree>
-      <p:nvGrpSpPr>
-        <p:cNvPr id="1" name=""/>
-        <p:cNvGrpSpPr/>
-        <p:nvPr/>
-      </p:nvGrpSpPr>
-      <p:grpSpPr>
-        <a:xfrm>
-          <a:off x="0" y="0"/>
-          <a:ext cx="0" cy="0"/>
-          <a:chOff x="0" y="0"/>
-          <a:chExt cx="0" cy="0"/>
-        </a:xfrm>
-      </p:grpSpPr>
-      <p:sp>
-        <p:nvSpPr>
-          <p:cNvPr id="2" name="Title 1"/>
-          <p:cNvSpPr>
-            <a:spLocks noGrp="1"/>
-          </p:cNvSpPr>
-          <p:nvPr>
-            <p:ph type="title"/>
-          </p:nvPr>
-        </p:nvSpPr>
-        <p:spPr/>
-        <p:txBody>
-          <a:bodyPr/>
-          <a:lstStyle/>
-          <a:p>
-            <a:r>
-              <a:rPr lang="en-US" dirty="0" smtClean="0"/>
-              <a:t>Visual Studio – Class IntelliSense</a:t>
-            </a:r>
-            <a:endParaRPr lang="en-US" dirty="0"/>
-          </a:p>
-        </p:txBody>
-      </p:sp>
-      <p:pic>
-        <p:nvPicPr>
-          <p:cNvPr id="4" name="Content Placeholder 3"/>
-          <p:cNvPicPr>
-            <a:picLocks noGrp="1" noChangeAspect="1"/>
-          </p:cNvPicPr>
-          <p:nvPr>
-            <p:ph sz="quarter" idx="10"/>
-          </p:nvPr>
-        </p:nvPicPr>
-        <p:blipFill>
-          <a:blip r:embed="rId2"/>
-          <a:stretch>
-            <a:fillRect/>
-          </a:stretch>
-        </p:blipFill>
-        <p:spPr>
-          <a:xfrm>
-            <a:off x="2440146" y="1973767"/>
-            <a:ext cx="5902167" cy="3283240"/>
-          </a:xfrm>
-          <a:prstGeom prst="rect">
-            <a:avLst/>
-          </a:prstGeom>
-        </p:spPr>
-      </p:pic>
-    </p:spTree>
-    <p:extLst>
-      <p:ext uri="{BB962C8B-B14F-4D97-AF65-F5344CB8AC3E}">
-        <p14:creationId xmlns:p14="http://schemas.microsoft.com/office/powerpoint/2010/main" val="2661705909"/>
-      </p:ext>
-    </p:extLst>
-  </p:cSld>
-  <p:clrMapOvr>
-    <a:masterClrMapping/>
-  </p:clrMapOvr>
-  <p:timing>
-    <p:tnLst>
-      <p:par>
-        <p:cTn id="1" dur="indefinite" restart="never" nodeType="tmRoot"/>
-      </p:par>
-    </p:tnLst>
-  </p:timing>
-</p:sld>
-</file>
-
-<file path=ppt/slides/slide23.xml><?xml version="1.0" encoding="utf-8"?>
-<p:sld xmlns:a="http://schemas.openxmlformats.org/drawingml/2006/main" xmlns:r="http://schemas.openxmlformats.org/officeDocument/2006/relationships" xmlns:p="http://schemas.openxmlformats.org/presentationml/2006/main">
-  <p:cSld>
-    <p:spTree>
-      <p:nvGrpSpPr>
-        <p:cNvPr id="1" name=""/>
-        <p:cNvGrpSpPr/>
-        <p:nvPr/>
-      </p:nvGrpSpPr>
-      <p:grpSpPr>
-        <a:xfrm>
-          <a:off x="0" y="0"/>
-          <a:ext cx="0" cy="0"/>
-          <a:chOff x="0" y="0"/>
-          <a:chExt cx="0" cy="0"/>
-        </a:xfrm>
-      </p:grpSpPr>
-      <p:sp>
-        <p:nvSpPr>
-          <p:cNvPr id="2" name="Title 1"/>
-          <p:cNvSpPr>
-            <a:spLocks noGrp="1"/>
-          </p:cNvSpPr>
-          <p:nvPr>
-            <p:ph type="title"/>
-          </p:nvPr>
-        </p:nvSpPr>
-        <p:spPr/>
-        <p:txBody>
-          <a:bodyPr/>
-          <a:lstStyle/>
-          <a:p>
-            <a:r>
-              <a:rPr lang="en-US" dirty="0" smtClean="0"/>
-              <a:t>Visual Studio – Missing Class Detection</a:t>
-            </a:r>
-            <a:endParaRPr lang="en-US" dirty="0"/>
-          </a:p>
-        </p:txBody>
-      </p:sp>
-      <p:pic>
-        <p:nvPicPr>
-          <p:cNvPr id="4" name="Content Placeholder 3"/>
-          <p:cNvPicPr>
-            <a:picLocks noGrp="1" noChangeAspect="1"/>
-          </p:cNvPicPr>
-          <p:nvPr>
-            <p:ph sz="quarter" idx="10"/>
-          </p:nvPr>
-        </p:nvPicPr>
-        <p:blipFill>
-          <a:blip r:embed="rId2"/>
-          <a:stretch>
-            <a:fillRect/>
-          </a:stretch>
-        </p:blipFill>
-        <p:spPr>
-          <a:xfrm>
-            <a:off x="961984" y="2386361"/>
-            <a:ext cx="7276367" cy="1598709"/>
-          </a:xfrm>
-          <a:prstGeom prst="rect">
-            <a:avLst/>
-          </a:prstGeom>
-        </p:spPr>
-      </p:pic>
-    </p:spTree>
-    <p:extLst>
-      <p:ext uri="{BB962C8B-B14F-4D97-AF65-F5344CB8AC3E}">
-        <p14:creationId xmlns:p14="http://schemas.microsoft.com/office/powerpoint/2010/main" val="360559877"/>
-      </p:ext>
-    </p:extLst>
-  </p:cSld>
-  <p:clrMapOvr>
-    <a:masterClrMapping/>
-  </p:clrMapOvr>
-  <p:timing>
-    <p:tnLst>
-      <p:par>
-        <p:cTn id="1" dur="indefinite" restart="never" nodeType="tmRoot"/>
-      </p:par>
-    </p:tnLst>
-  </p:timing>
-</p:sld>
-</file>
-
-<file path=ppt/slides/slide24.xml><?xml version="1.0" encoding="utf-8"?>
-<p:sld xmlns:a="http://schemas.openxmlformats.org/drawingml/2006/main" xmlns:r="http://schemas.openxmlformats.org/officeDocument/2006/relationships" xmlns:p="http://schemas.openxmlformats.org/presentationml/2006/main">
-  <p:cSld>
-    <p:spTree>
-      <p:nvGrpSpPr>
-        <p:cNvPr id="1" name=""/>
-        <p:cNvGrpSpPr/>
-        <p:nvPr/>
-      </p:nvGrpSpPr>
-      <p:grpSpPr>
-        <a:xfrm>
-          <a:off x="0" y="0"/>
-          <a:ext cx="0" cy="0"/>
-          <a:chOff x="0" y="0"/>
-          <a:chExt cx="0" cy="0"/>
-        </a:xfrm>
-      </p:grpSpPr>
-      <p:sp>
-        <p:nvSpPr>
-          <p:cNvPr id="2" name="Title 1"/>
-          <p:cNvSpPr>
-            <a:spLocks noGrp="1"/>
-          </p:cNvSpPr>
-          <p:nvPr>
-            <p:ph type="title"/>
-          </p:nvPr>
-        </p:nvSpPr>
-        <p:spPr/>
-        <p:txBody>
-          <a:bodyPr/>
-          <a:lstStyle/>
-          <a:p>
-            <a:r>
-              <a:rPr lang="en-US" dirty="0" smtClean="0"/>
-              <a:t>Visual </a:t>
-            </a:r>
-            <a:r>
-              <a:rPr lang="en-US" smtClean="0"/>
-              <a:t>Studio Support</a:t>
-            </a:r>
-            <a:endParaRPr lang="en-US" dirty="0"/>
-          </a:p>
-        </p:txBody>
-      </p:sp>
-    </p:spTree>
-    <p:extLst>
-      <p:ext uri="{BB962C8B-B14F-4D97-AF65-F5344CB8AC3E}">
-        <p14:creationId xmlns:p14="http://schemas.microsoft.com/office/powerpoint/2010/main" val="2582563794"/>
-      </p:ext>
-    </p:extLst>
-  </p:cSld>
-  <p:clrMapOvr>
-    <a:masterClrMapping/>
-  </p:clrMapOvr>
-  <p:timing>
-    <p:tnLst>
-      <p:par>
-        <p:cTn id="1" dur="indefinite" restart="never" nodeType="tmRoot"/>
-      </p:par>
-    </p:tnLst>
-  </p:timing>
-</p:sld>
-</file>
-
-<file path=ppt/slides/slide25.xml><?xml version="1.0" encoding="utf-8"?>
-<p:sld xmlns:a="http://schemas.openxmlformats.org/drawingml/2006/main" xmlns:r="http://schemas.openxmlformats.org/officeDocument/2006/relationships" xmlns:p="http://schemas.openxmlformats.org/presentationml/2006/main">
-  <p:cSld>
-    <p:spTree>
-      <p:nvGrpSpPr>
-        <p:cNvPr id="1" name=""/>
-        <p:cNvGrpSpPr/>
-        <p:nvPr/>
-      </p:nvGrpSpPr>
-      <p:grpSpPr>
-        <a:xfrm>
-          <a:off x="0" y="0"/>
-          <a:ext cx="0" cy="0"/>
-          <a:chOff x="0" y="0"/>
-          <a:chExt cx="0" cy="0"/>
-        </a:xfrm>
-      </p:grpSpPr>
-    </p:spTree>
-    <p:extLst>
-      <p:ext uri="{BB962C8B-B14F-4D97-AF65-F5344CB8AC3E}">
-        <p14:creationId xmlns:p14="http://schemas.microsoft.com/office/powerpoint/2010/main" val="13701683"/>
-      </p:ext>
-    </p:extLst>
-  </p:cSld>
-  <p:clrMapOvr>
-    <a:masterClrMapping/>
-  </p:clrMapOvr>
-  <mc:AlternateContent xmlns:mc="http://schemas.openxmlformats.org/markup-compatibility/2006" xmlns:p14="http://schemas.microsoft.com/office/powerpoint/2010/main">
-    <mc:Choice Requires="p14">
-      <p:transition spd="slow" p14:dur="2000"/>
-    </mc:Choice>
-    <mc:Fallback xmlns="">
-      <p:transition spd="slow"/>
-    </mc:Fallback>
-  </mc:AlternateContent>
   <p:timing>
     <p:tnLst>
       <p:par>
@@ -7893,18 +6027,18 @@
 </file>
 
 <file path=customXml/item1.xml><?xml version="1.0" encoding="utf-8"?>
-<p:properties xmlns:p="http://schemas.microsoft.com/office/2006/metadata/properties" xmlns:xsi="http://www.w3.org/2001/XMLSchema-instance" xmlns:pc="http://schemas.microsoft.com/office/infopath/2007/PartnerControls">
-  <documentManagement/>
-</p:properties>
-</file>
-
-<file path=customXml/item2.xml><?xml version="1.0" encoding="utf-8"?>
 <?mso-contentType ?>
 <FormTemplates xmlns="http://schemas.microsoft.com/sharepoint/v3/contenttype/forms">
   <Display>DocumentLibraryForm</Display>
   <Edit>DocumentLibraryForm</Edit>
   <New>DocumentLibraryForm</New>
 </FormTemplates>
+</file>
+
+<file path=customXml/item2.xml><?xml version="1.0" encoding="utf-8"?>
+<p:properties xmlns:p="http://schemas.microsoft.com/office/2006/metadata/properties" xmlns:xsi="http://www.w3.org/2001/XMLSchema-instance" xmlns:pc="http://schemas.microsoft.com/office/infopath/2007/PartnerControls">
+  <documentManagement/>
+</p:properties>
 </file>
 
 <file path=customXml/item3.xml><?xml version="1.0" encoding="utf-8"?>
@@ -8048,6 +6182,14 @@
 </file>
 
 <file path=customXml/itemProps1.xml><?xml version="1.0" encoding="utf-8"?>
+<ds:datastoreItem xmlns:ds="http://schemas.openxmlformats.org/officeDocument/2006/customXml" ds:itemID="{B0CA13EC-1D3C-4D6F-8D1C-E8A452CFC79A}">
+  <ds:schemaRefs>
+    <ds:schemaRef ds:uri="http://schemas.microsoft.com/sharepoint/v3/contenttype/forms"/>
+  </ds:schemaRefs>
+</ds:datastoreItem>
+</file>
+
+<file path=customXml/itemProps2.xml><?xml version="1.0" encoding="utf-8"?>
 <ds:datastoreItem xmlns:ds="http://schemas.openxmlformats.org/officeDocument/2006/customXml" ds:itemID="{7025FDD9-4C58-4084-9F89-0E6ADD6FFF55}">
   <ds:schemaRefs>
     <ds:schemaRef ds:uri="http://purl.org/dc/terms/"/>
@@ -8059,14 +6201,6 @@
     <ds:schemaRef ds:uri="239b4775-11ac-4188-ac69-b5b775bb2155"/>
     <ds:schemaRef ds:uri="http://schemas.microsoft.com/office/2006/metadata/properties"/>
     <ds:schemaRef ds:uri="http://www.w3.org/XML/1998/namespace"/>
-  </ds:schemaRefs>
-</ds:datastoreItem>
-</file>
-
-<file path=customXml/itemProps2.xml><?xml version="1.0" encoding="utf-8"?>
-<ds:datastoreItem xmlns:ds="http://schemas.openxmlformats.org/officeDocument/2006/customXml" ds:itemID="{B0CA13EC-1D3C-4D6F-8D1C-E8A452CFC79A}">
-  <ds:schemaRefs>
-    <ds:schemaRef ds:uri="http://schemas.microsoft.com/sharepoint/v3/contenttype/forms"/>
   </ds:schemaRefs>
 </ds:datastoreItem>
 </file>

</xml_diff>